<commit_message>
EIU Atender cancelacion completado
</commit_message>
<xml_diff>
--- a/TAF 092019/Cancelación.pptx
+++ b/TAF 092019/Cancelación.pptx
@@ -261,7 +261,7 @@
 </file>
 
 <file path=ppt/activeX/activeX20.xml><?xml version="1.0" encoding="utf-8"?>
-<ax:ocx xmlns:ax="http://schemas.microsoft.com/office/2006/activeX" xmlns:r="http://schemas.openxmlformats.org/officeDocument/2006/relationships" ax:classid="{8BD21D40-EC42-11CE-9E0D-00AA006002F3}" ax:persistence="persistStorage" r:id="rId1"/>
+<ax:ocx xmlns:ax="http://schemas.microsoft.com/office/2006/activeX" xmlns:r="http://schemas.openxmlformats.org/officeDocument/2006/relationships" ax:classid="{8BD21D20-EC42-11CE-9E0D-00AA006002F3}" ax:persistence="persistStorage" r:id="rId1"/>
 </file>
 
 <file path=ppt/activeX/activeX21.xml><?xml version="1.0" encoding="utf-8"?>
@@ -273,19 +273,19 @@
 </file>
 
 <file path=ppt/activeX/activeX23.xml><?xml version="1.0" encoding="utf-8"?>
+<ax:ocx xmlns:ax="http://schemas.microsoft.com/office/2006/activeX" xmlns:r="http://schemas.openxmlformats.org/officeDocument/2006/relationships" ax:classid="{8BD21D40-EC42-11CE-9E0D-00AA006002F3}" ax:persistence="persistStorage" r:id="rId1"/>
+</file>
+
+<file path=ppt/activeX/activeX24.xml><?xml version="1.0" encoding="utf-8"?>
 <ax:ocx xmlns:ax="http://schemas.microsoft.com/office/2006/activeX" xmlns:r="http://schemas.openxmlformats.org/officeDocument/2006/relationships" ax:classid="{8BD21D30-EC42-11CE-9E0D-00AA006002F3}" ax:persistence="persistStorage" r:id="rId1"/>
 </file>
 
-<file path=ppt/activeX/activeX24.xml><?xml version="1.0" encoding="utf-8"?>
+<file path=ppt/activeX/activeX25.xml><?xml version="1.0" encoding="utf-8"?>
 <ax:ocx xmlns:ax="http://schemas.microsoft.com/office/2006/activeX" xmlns:r="http://schemas.openxmlformats.org/officeDocument/2006/relationships" ax:classid="{8BD21D20-EC42-11CE-9E0D-00AA006002F3}" ax:persistence="persistStorage" r:id="rId1"/>
 </file>
 
-<file path=ppt/activeX/activeX25.xml><?xml version="1.0" encoding="utf-8"?>
+<file path=ppt/activeX/activeX26.xml><?xml version="1.0" encoding="utf-8"?>
 <ax:ocx xmlns:ax="http://schemas.microsoft.com/office/2006/activeX" xmlns:r="http://schemas.openxmlformats.org/officeDocument/2006/relationships" ax:classid="{8BD21D30-EC42-11CE-9E0D-00AA006002F3}" ax:persistence="persistStorage" r:id="rId1"/>
-</file>
-
-<file path=ppt/activeX/activeX26.xml><?xml version="1.0" encoding="utf-8"?>
-<ax:ocx xmlns:ax="http://schemas.microsoft.com/office/2006/activeX" xmlns:r="http://schemas.openxmlformats.org/officeDocument/2006/relationships" ax:classid="{8BD21D20-EC42-11CE-9E0D-00AA006002F3}" ax:persistence="persistStorage" r:id="rId1"/>
 </file>
 
 <file path=ppt/activeX/activeX27.xml><?xml version="1.0" encoding="utf-8"?>
@@ -293,7 +293,7 @@
 </file>
 
 <file path=ppt/activeX/activeX28.xml><?xml version="1.0" encoding="utf-8"?>
-<ax:ocx xmlns:ax="http://schemas.microsoft.com/office/2006/activeX" xmlns:r="http://schemas.openxmlformats.org/officeDocument/2006/relationships" ax:classid="{8BD21D40-EC42-11CE-9E0D-00AA006002F3}" ax:persistence="persistStorage" r:id="rId1"/>
+<ax:ocx xmlns:ax="http://schemas.microsoft.com/office/2006/activeX" xmlns:r="http://schemas.openxmlformats.org/officeDocument/2006/relationships" ax:classid="{8BD21D20-EC42-11CE-9E0D-00AA006002F3}" ax:persistence="persistStorage" r:id="rId1"/>
 </file>
 
 <file path=ppt/activeX/activeX29.xml><?xml version="1.0" encoding="utf-8"?>
@@ -309,7 +309,7 @@
 </file>
 
 <file path=ppt/activeX/activeX31.xml><?xml version="1.0" encoding="utf-8"?>
-<ax:ocx xmlns:ax="http://schemas.microsoft.com/office/2006/activeX" xmlns:r="http://schemas.openxmlformats.org/officeDocument/2006/relationships" ax:classid="{8BD21D20-EC42-11CE-9E0D-00AA006002F3}" ax:persistence="persistStorage" r:id="rId1"/>
+<ax:ocx xmlns:ax="http://schemas.microsoft.com/office/2006/activeX" xmlns:r="http://schemas.openxmlformats.org/officeDocument/2006/relationships" ax:classid="{8BD21D40-EC42-11CE-9E0D-00AA006002F3}" ax:persistence="persistStorage" r:id="rId1"/>
 </file>
 
 <file path=ppt/activeX/activeX32.xml><?xml version="1.0" encoding="utf-8"?>
@@ -317,7 +317,7 @@
 </file>
 
 <file path=ppt/activeX/activeX33.xml><?xml version="1.0" encoding="utf-8"?>
-<ax:ocx xmlns:ax="http://schemas.microsoft.com/office/2006/activeX" xmlns:r="http://schemas.openxmlformats.org/officeDocument/2006/relationships" ax:classid="{8BD21D40-EC42-11CE-9E0D-00AA006002F3}" ax:persistence="persistStorage" r:id="rId1"/>
+<ax:ocx xmlns:ax="http://schemas.microsoft.com/office/2006/activeX" xmlns:r="http://schemas.openxmlformats.org/officeDocument/2006/relationships" ax:classid="{8BD21D20-EC42-11CE-9E0D-00AA006002F3}" ax:persistence="persistStorage" r:id="rId1"/>
 </file>
 
 <file path=ppt/activeX/activeX34.xml><?xml version="1.0" encoding="utf-8"?>
@@ -325,19 +325,19 @@
 </file>
 
 <file path=ppt/activeX/activeX35.xml><?xml version="1.0" encoding="utf-8"?>
+<ax:ocx xmlns:ax="http://schemas.microsoft.com/office/2006/activeX" xmlns:r="http://schemas.openxmlformats.org/officeDocument/2006/relationships" ax:classid="{8BD21D40-EC42-11CE-9E0D-00AA006002F3}" ax:persistence="persistStorage" r:id="rId1"/>
+</file>
+
+<file path=ppt/activeX/activeX36.xml><?xml version="1.0" encoding="utf-8"?>
 <ax:ocx xmlns:ax="http://schemas.microsoft.com/office/2006/activeX" xmlns:r="http://schemas.openxmlformats.org/officeDocument/2006/relationships" ax:classid="{8BD21D30-EC42-11CE-9E0D-00AA006002F3}" ax:persistence="persistStorage" r:id="rId1"/>
 </file>
 
-<file path=ppt/activeX/activeX36.xml><?xml version="1.0" encoding="utf-8"?>
+<file path=ppt/activeX/activeX37.xml><?xml version="1.0" encoding="utf-8"?>
 <ax:ocx xmlns:ax="http://schemas.microsoft.com/office/2006/activeX" xmlns:r="http://schemas.openxmlformats.org/officeDocument/2006/relationships" ax:classid="{8BD21D20-EC42-11CE-9E0D-00AA006002F3}" ax:persistence="persistStorage" r:id="rId1"/>
 </file>
 
-<file path=ppt/activeX/activeX37.xml><?xml version="1.0" encoding="utf-8"?>
+<file path=ppt/activeX/activeX38.xml><?xml version="1.0" encoding="utf-8"?>
 <ax:ocx xmlns:ax="http://schemas.microsoft.com/office/2006/activeX" xmlns:r="http://schemas.openxmlformats.org/officeDocument/2006/relationships" ax:classid="{8BD21D30-EC42-11CE-9E0D-00AA006002F3}" ax:persistence="persistStorage" r:id="rId1"/>
-</file>
-
-<file path=ppt/activeX/activeX38.xml><?xml version="1.0" encoding="utf-8"?>
-<ax:ocx xmlns:ax="http://schemas.microsoft.com/office/2006/activeX" xmlns:r="http://schemas.openxmlformats.org/officeDocument/2006/relationships" ax:classid="{8BD21D20-EC42-11CE-9E0D-00AA006002F3}" ax:persistence="persistStorage" r:id="rId1"/>
 </file>
 
 <file path=ppt/activeX/activeX39.xml><?xml version="1.0" encoding="utf-8"?>
@@ -361,7 +361,7 @@
 </file>
 
 <file path=ppt/activeX/activeX43.xml><?xml version="1.0" encoding="utf-8"?>
-<ax:ocx xmlns:ax="http://schemas.microsoft.com/office/2006/activeX" xmlns:r="http://schemas.openxmlformats.org/officeDocument/2006/relationships" ax:classid="{8BD21D30-EC42-11CE-9E0D-00AA006002F3}" ax:persistence="persistStorage" r:id="rId1"/>
+<ax:ocx xmlns:ax="http://schemas.microsoft.com/office/2006/activeX" xmlns:r="http://schemas.openxmlformats.org/officeDocument/2006/relationships" ax:classid="{8BD21D20-EC42-11CE-9E0D-00AA006002F3}" ax:persistence="persistStorage" r:id="rId1"/>
 </file>
 
 <file path=ppt/activeX/activeX44.xml><?xml version="1.0" encoding="utf-8"?>
@@ -369,11 +369,11 @@
 </file>
 
 <file path=ppt/activeX/activeX45.xml><?xml version="1.0" encoding="utf-8"?>
-<ax:ocx xmlns:ax="http://schemas.microsoft.com/office/2006/activeX" xmlns:r="http://schemas.openxmlformats.org/officeDocument/2006/relationships" ax:classid="{8BD21D20-EC42-11CE-9E0D-00AA006002F3}" ax:persistence="persistStorage" r:id="rId1"/>
+<ax:ocx xmlns:ax="http://schemas.microsoft.com/office/2006/activeX" xmlns:r="http://schemas.openxmlformats.org/officeDocument/2006/relationships" ax:classid="{8BD21D30-EC42-11CE-9E0D-00AA006002F3}" ax:persistence="persistStorage" r:id="rId1"/>
 </file>
 
 <file path=ppt/activeX/activeX46.xml><?xml version="1.0" encoding="utf-8"?>
-<ax:ocx xmlns:ax="http://schemas.microsoft.com/office/2006/activeX" xmlns:r="http://schemas.openxmlformats.org/officeDocument/2006/relationships" ax:classid="{8BD21D30-EC42-11CE-9E0D-00AA006002F3}" ax:persistence="persistStorage" r:id="rId1"/>
+<ax:ocx xmlns:ax="http://schemas.microsoft.com/office/2006/activeX" xmlns:r="http://schemas.openxmlformats.org/officeDocument/2006/relationships" ax:classid="{8BD21D20-EC42-11CE-9E0D-00AA006002F3}" ax:persistence="persistStorage" r:id="rId1"/>
 </file>
 
 <file path=ppt/activeX/activeX47.xml><?xml version="1.0" encoding="utf-8"?>
@@ -381,11 +381,11 @@
 </file>
 
 <file path=ppt/activeX/activeX48.xml><?xml version="1.0" encoding="utf-8"?>
-<ax:ocx xmlns:ax="http://schemas.microsoft.com/office/2006/activeX" xmlns:r="http://schemas.openxmlformats.org/officeDocument/2006/relationships" ax:classid="{8BD21D20-EC42-11CE-9E0D-00AA006002F3}" ax:persistence="persistStorage" r:id="rId1"/>
+<ax:ocx xmlns:ax="http://schemas.microsoft.com/office/2006/activeX" xmlns:r="http://schemas.openxmlformats.org/officeDocument/2006/relationships" ax:classid="{8BD21D30-EC42-11CE-9E0D-00AA006002F3}" ax:persistence="persistStorage" r:id="rId1"/>
 </file>
 
 <file path=ppt/activeX/activeX49.xml><?xml version="1.0" encoding="utf-8"?>
-<ax:ocx xmlns:ax="http://schemas.microsoft.com/office/2006/activeX" xmlns:r="http://schemas.openxmlformats.org/officeDocument/2006/relationships" ax:classid="{8BD21D30-EC42-11CE-9E0D-00AA006002F3}" ax:persistence="persistStorage" r:id="rId1"/>
+<ax:ocx xmlns:ax="http://schemas.microsoft.com/office/2006/activeX" xmlns:r="http://schemas.openxmlformats.org/officeDocument/2006/relationships" ax:classid="{8BD21D20-EC42-11CE-9E0D-00AA006002F3}" ax:persistence="persistStorage" r:id="rId1"/>
 </file>
 
 <file path=ppt/activeX/activeX5.xml><?xml version="1.0" encoding="utf-8"?>
@@ -397,15 +397,15 @@
 </file>
 
 <file path=ppt/activeX/activeX51.xml><?xml version="1.0" encoding="utf-8"?>
+<ax:ocx xmlns:ax="http://schemas.microsoft.com/office/2006/activeX" xmlns:r="http://schemas.openxmlformats.org/officeDocument/2006/relationships" ax:classid="{8BD21D30-EC42-11CE-9E0D-00AA006002F3}" ax:persistence="persistStorage" r:id="rId1"/>
+</file>
+
+<file path=ppt/activeX/activeX52.xml><?xml version="1.0" encoding="utf-8"?>
 <ax:ocx xmlns:ax="http://schemas.microsoft.com/office/2006/activeX" xmlns:r="http://schemas.openxmlformats.org/officeDocument/2006/relationships" ax:classid="{8BD21D20-EC42-11CE-9E0D-00AA006002F3}" ax:persistence="persistStorage" r:id="rId1"/>
 </file>
 
-<file path=ppt/activeX/activeX52.xml><?xml version="1.0" encoding="utf-8"?>
+<file path=ppt/activeX/activeX53.xml><?xml version="1.0" encoding="utf-8"?>
 <ax:ocx xmlns:ax="http://schemas.microsoft.com/office/2006/activeX" xmlns:r="http://schemas.openxmlformats.org/officeDocument/2006/relationships" ax:classid="{8BD21D30-EC42-11CE-9E0D-00AA006002F3}" ax:persistence="persistStorage" r:id="rId1"/>
-</file>
-
-<file path=ppt/activeX/activeX53.xml><?xml version="1.0" encoding="utf-8"?>
-<ax:ocx xmlns:ax="http://schemas.microsoft.com/office/2006/activeX" xmlns:r="http://schemas.openxmlformats.org/officeDocument/2006/relationships" ax:classid="{8BD21D20-EC42-11CE-9E0D-00AA006002F3}" ax:persistence="persistStorage" r:id="rId1"/>
 </file>
 
 <file path=ppt/activeX/activeX54.xml><?xml version="1.0" encoding="utf-8"?>
@@ -425,11 +425,11 @@
 </file>
 
 <file path=ppt/activeX/activeX58.xml><?xml version="1.0" encoding="utf-8"?>
-<ax:ocx xmlns:ax="http://schemas.microsoft.com/office/2006/activeX" xmlns:r="http://schemas.openxmlformats.org/officeDocument/2006/relationships" ax:classid="{8BD21D30-EC42-11CE-9E0D-00AA006002F3}" ax:persistence="persistStorage" r:id="rId1"/>
+<ax:ocx xmlns:ax="http://schemas.microsoft.com/office/2006/activeX" xmlns:r="http://schemas.openxmlformats.org/officeDocument/2006/relationships" ax:classid="{8BD21D20-EC42-11CE-9E0D-00AA006002F3}" ax:persistence="persistStorage" r:id="rId1"/>
 </file>
 
 <file path=ppt/activeX/activeX59.xml><?xml version="1.0" encoding="utf-8"?>
-<ax:ocx xmlns:ax="http://schemas.microsoft.com/office/2006/activeX" xmlns:r="http://schemas.openxmlformats.org/officeDocument/2006/relationships" ax:classid="{8BD21D20-EC42-11CE-9E0D-00AA006002F3}" ax:persistence="persistStorage" r:id="rId1"/>
+<ax:ocx xmlns:ax="http://schemas.microsoft.com/office/2006/activeX" xmlns:r="http://schemas.openxmlformats.org/officeDocument/2006/relationships" ax:classid="{8BD21D30-EC42-11CE-9E0D-00AA006002F3}" ax:persistence="persistStorage" r:id="rId1"/>
 </file>
 
 <file path=ppt/activeX/activeX6.xml><?xml version="1.0" encoding="utf-8"?>
@@ -441,6 +441,10 @@
 </file>
 
 <file path=ppt/activeX/activeX61.xml><?xml version="1.0" encoding="utf-8"?>
+<ax:ocx xmlns:ax="http://schemas.microsoft.com/office/2006/activeX" xmlns:r="http://schemas.openxmlformats.org/officeDocument/2006/relationships" ax:classid="{8BD21D20-EC42-11CE-9E0D-00AA006002F3}" ax:persistence="persistStorage" r:id="rId1"/>
+</file>
+
+<file path=ppt/activeX/activeX62.xml><?xml version="1.0" encoding="utf-8"?>
 <ax:ocx xmlns:ax="http://schemas.microsoft.com/office/2006/activeX" xmlns:r="http://schemas.openxmlformats.org/officeDocument/2006/relationships" ax:classid="{8BD21D30-EC42-11CE-9E0D-00AA006002F3}" ax:persistence="persistStorage" r:id="rId1"/>
 </file>
 
@@ -5144,7 +5148,7 @@
     <p:controls>
       <mc:AlternateContent xmlns:mc="http://schemas.openxmlformats.org/markup-compatibility/2006">
         <mc:Choice xmlns:v="urn:schemas-microsoft-com:vml" Requires="v">
-          <p:control spid="4407" name="ComboBox1" r:id="rId2" imgW="1514520" imgH="314280"/>
+          <p:control spid="4416" name="ComboBox1" r:id="rId2" imgW="1514520" imgH="314280"/>
         </mc:Choice>
         <mc:Fallback>
           <p:control name="ComboBox1" r:id="rId2" imgW="1514520" imgH="314280">
@@ -5177,7 +5181,7 @@
       </mc:AlternateContent>
       <mc:AlternateContent xmlns:mc="http://schemas.openxmlformats.org/markup-compatibility/2006">
         <mc:Choice xmlns:v="urn:schemas-microsoft-com:vml" Requires="v">
-          <p:control spid="4408" name="ListBox2" r:id="rId3" imgW="2085840" imgH="295200"/>
+          <p:control spid="4417" name="ListBox2" r:id="rId3" imgW="2085840" imgH="295200"/>
         </mc:Choice>
         <mc:Fallback>
           <p:control name="ListBox2" r:id="rId3" imgW="2085840" imgH="295200">
@@ -5210,7 +5214,7 @@
       </mc:AlternateContent>
       <mc:AlternateContent xmlns:mc="http://schemas.openxmlformats.org/markup-compatibility/2006">
         <mc:Choice xmlns:v="urn:schemas-microsoft-com:vml" Requires="v">
-          <p:control spid="4409" name="ComboBox3" r:id="rId4" imgW="1628640" imgH="371520"/>
+          <p:control spid="4418" name="ComboBox3" r:id="rId4" imgW="1628640" imgH="371520"/>
         </mc:Choice>
         <mc:Fallback>
           <p:control name="ComboBox3" r:id="rId4" imgW="1628640" imgH="371520">
@@ -5708,20 +5712,176 @@
       </p:sp>
       <p:sp>
         <p:nvSpPr>
-          <p:cNvPr id="50" name="Rectángulo 49"/>
+          <p:cNvPr id="51" name="CuadroTexto 50"/>
+          <p:cNvSpPr txBox="1"/>
+          <p:nvPr/>
+        </p:nvSpPr>
+        <p:spPr>
+          <a:xfrm>
+            <a:off x="186905" y="3289260"/>
+            <a:ext cx="3082834" cy="276999"/>
+          </a:xfrm>
+          <a:prstGeom prst="rect">
+            <a:avLst/>
+          </a:prstGeom>
+          <a:noFill/>
+        </p:spPr>
+        <p:txBody>
+          <a:bodyPr wrap="square" rtlCol="0">
+            <a:spAutoFit/>
+          </a:bodyPr>
+          <a:lstStyle/>
+          <a:p>
+            <a:r>
+              <a:rPr lang="es-MX" sz="1200" dirty="0" smtClean="0"/>
+              <a:t>Días otorgados</a:t>
+            </a:r>
+            <a:endParaRPr lang="es-MX" sz="1200" dirty="0"/>
+          </a:p>
+        </p:txBody>
+      </p:sp>
+      <p:sp>
+        <p:nvSpPr>
+          <p:cNvPr id="53" name="Rectángulo 52"/>
           <p:cNvSpPr/>
           <p:nvPr/>
         </p:nvSpPr>
         <p:spPr>
           <a:xfrm>
-            <a:off x="1746463" y="2905610"/>
+            <a:off x="1726284" y="3299288"/>
+            <a:ext cx="2789778" cy="232873"/>
+          </a:xfrm>
+          <a:prstGeom prst="rect">
+            <a:avLst/>
+          </a:prstGeom>
+          <a:solidFill>
+            <a:schemeClr val="bg1">
+              <a:lumMod val="85000"/>
+            </a:schemeClr>
+          </a:solidFill>
+          <a:ln>
+            <a:solidFill>
+              <a:schemeClr val="bg1">
+                <a:lumMod val="85000"/>
+              </a:schemeClr>
+            </a:solidFill>
+          </a:ln>
+        </p:spPr>
+        <p:style>
+          <a:lnRef idx="2">
+            <a:schemeClr val="accent1">
+              <a:shade val="50000"/>
+            </a:schemeClr>
+          </a:lnRef>
+          <a:fillRef idx="1">
+            <a:schemeClr val="accent1"/>
+          </a:fillRef>
+          <a:effectRef idx="0">
+            <a:schemeClr val="accent1"/>
+          </a:effectRef>
+          <a:fontRef idx="minor">
+            <a:schemeClr val="lt1"/>
+          </a:fontRef>
+        </p:style>
+        <p:txBody>
+          <a:bodyPr rtlCol="0" anchor="ctr"/>
+          <a:lstStyle/>
+          <a:p>
+            <a:pPr algn="ctr"/>
+            <a:r>
+              <a:rPr lang="es-ES" dirty="0" smtClean="0">
+                <a:solidFill>
+                  <a:schemeClr val="tx1"/>
+                </a:solidFill>
+              </a:rPr>
+              <a:t>5</a:t>
+            </a:r>
+            <a:endParaRPr lang="es-ES" dirty="0">
+              <a:solidFill>
+                <a:schemeClr val="tx1"/>
+              </a:solidFill>
+            </a:endParaRPr>
+          </a:p>
+        </p:txBody>
+      </p:sp>
+      <p:sp>
+        <p:nvSpPr>
+          <p:cNvPr id="55" name="CuadroTexto 54"/>
+          <p:cNvSpPr txBox="1"/>
+          <p:nvPr/>
+        </p:nvSpPr>
+        <p:spPr>
+          <a:xfrm>
+            <a:off x="215404" y="4809074"/>
+            <a:ext cx="3082834" cy="276999"/>
+          </a:xfrm>
+          <a:prstGeom prst="rect">
+            <a:avLst/>
+          </a:prstGeom>
+          <a:noFill/>
+        </p:spPr>
+        <p:txBody>
+          <a:bodyPr wrap="square" rtlCol="0">
+            <a:spAutoFit/>
+          </a:bodyPr>
+          <a:lstStyle/>
+          <a:p>
+            <a:r>
+              <a:rPr lang="es-MX" sz="1200" dirty="0" smtClean="0"/>
+              <a:t>Número de oficio </a:t>
+            </a:r>
+            <a:endParaRPr lang="es-MX" sz="1200" dirty="0"/>
+          </a:p>
+        </p:txBody>
+      </p:sp>
+      <p:sp>
+        <p:nvSpPr>
+          <p:cNvPr id="56" name="CuadroTexto 55"/>
+          <p:cNvSpPr txBox="1"/>
+          <p:nvPr/>
+        </p:nvSpPr>
+        <p:spPr>
+          <a:xfrm>
+            <a:off x="4712395" y="4799871"/>
+            <a:ext cx="2284150" cy="461665"/>
+          </a:xfrm>
+          <a:prstGeom prst="rect">
+            <a:avLst/>
+          </a:prstGeom>
+          <a:noFill/>
+        </p:spPr>
+        <p:txBody>
+          <a:bodyPr wrap="square" rtlCol="0">
+            <a:spAutoFit/>
+          </a:bodyPr>
+          <a:lstStyle/>
+          <a:p>
+            <a:r>
+              <a:rPr lang="es-MX" sz="1200" dirty="0" smtClean="0"/>
+              <a:t>Fecha de vencimiento de la prórroga</a:t>
+            </a:r>
+            <a:endParaRPr lang="es-MX" sz="1200" dirty="0"/>
+          </a:p>
+        </p:txBody>
+      </p:sp>
+      <p:sp>
+        <p:nvSpPr>
+          <p:cNvPr id="57" name="Rectángulo 56"/>
+          <p:cNvSpPr/>
+          <p:nvPr/>
+        </p:nvSpPr>
+        <p:spPr>
+          <a:xfrm>
+            <a:off x="6771059" y="4777380"/>
             <a:ext cx="2769599" cy="276999"/>
           </a:xfrm>
           <a:prstGeom prst="rect">
             <a:avLst/>
           </a:prstGeom>
           <a:solidFill>
-            <a:schemeClr val="bg1"/>
+            <a:schemeClr val="bg1">
+              <a:lumMod val="85000"/>
+            </a:schemeClr>
           </a:solidFill>
           <a:ln>
             <a:solidFill>
@@ -5758,44 +5918,14 @@
       </p:sp>
       <p:sp>
         <p:nvSpPr>
-          <p:cNvPr id="51" name="CuadroTexto 50"/>
-          <p:cNvSpPr txBox="1"/>
-          <p:nvPr/>
-        </p:nvSpPr>
-        <p:spPr>
-          <a:xfrm>
-            <a:off x="186905" y="3289260"/>
-            <a:ext cx="3082834" cy="276999"/>
-          </a:xfrm>
-          <a:prstGeom prst="rect">
-            <a:avLst/>
-          </a:prstGeom>
-          <a:noFill/>
-        </p:spPr>
-        <p:txBody>
-          <a:bodyPr wrap="square" rtlCol="0">
-            <a:spAutoFit/>
-          </a:bodyPr>
-          <a:lstStyle/>
-          <a:p>
-            <a:r>
-              <a:rPr lang="es-MX" sz="1200" dirty="0" smtClean="0"/>
-              <a:t>Días otorgados</a:t>
-            </a:r>
-            <a:endParaRPr lang="es-MX" sz="1200" dirty="0"/>
-          </a:p>
-        </p:txBody>
-      </p:sp>
-      <p:sp>
-        <p:nvSpPr>
-          <p:cNvPr id="53" name="Rectángulo 52"/>
+          <p:cNvPr id="58" name="Rectángulo 57"/>
           <p:cNvSpPr/>
           <p:nvPr/>
         </p:nvSpPr>
         <p:spPr>
           <a:xfrm>
-            <a:off x="1726284" y="3299288"/>
-            <a:ext cx="2789778" cy="232873"/>
+            <a:off x="1726284" y="2922637"/>
+            <a:ext cx="2769599" cy="276999"/>
           </a:xfrm>
           <a:prstGeom prst="rect">
             <a:avLst/>
@@ -5808,7 +5938,7 @@
           <a:ln>
             <a:solidFill>
               <a:schemeClr val="bg1">
-                <a:lumMod val="85000"/>
+                <a:lumMod val="95000"/>
               </a:schemeClr>
             </a:solidFill>
           </a:ln>
@@ -5834,15 +5964,93 @@
           <a:lstStyle/>
           <a:p>
             <a:pPr algn="ctr"/>
-            <a:r>
-              <a:rPr lang="es-ES" dirty="0" smtClean="0">
+            <a:endParaRPr lang="es-ES"/>
+          </a:p>
+        </p:txBody>
+      </p:sp>
+      <p:sp>
+        <p:nvSpPr>
+          <p:cNvPr id="60" name="CuadroTexto 59"/>
+          <p:cNvSpPr txBox="1"/>
+          <p:nvPr/>
+        </p:nvSpPr>
+        <p:spPr>
+          <a:xfrm>
+            <a:off x="211053" y="5111960"/>
+            <a:ext cx="3662068" cy="276999"/>
+          </a:xfrm>
+          <a:prstGeom prst="rect">
+            <a:avLst/>
+          </a:prstGeom>
+          <a:noFill/>
+        </p:spPr>
+        <p:txBody>
+          <a:bodyPr wrap="square" rtlCol="0">
+            <a:spAutoFit/>
+          </a:bodyPr>
+          <a:lstStyle/>
+          <a:p>
+            <a:r>
+              <a:rPr lang="es-MX" sz="1200" dirty="0" smtClean="0"/>
+              <a:t>Respuesta de la prórroga </a:t>
+            </a:r>
+            <a:endParaRPr lang="es-MX" sz="1200" dirty="0"/>
+          </a:p>
+        </p:txBody>
+      </p:sp>
+      <p:sp>
+        <p:nvSpPr>
+          <p:cNvPr id="62" name="Rectángulo redondeado 61">
+            <a:hlinkClick r:id="rId5" action="ppaction://hlinksldjump"/>
+          </p:cNvPr>
+          <p:cNvSpPr/>
+          <p:nvPr/>
+        </p:nvSpPr>
+        <p:spPr>
+          <a:xfrm>
+            <a:off x="6802656" y="6213453"/>
+            <a:ext cx="1629634" cy="373782"/>
+          </a:xfrm>
+          <a:prstGeom prst="roundRect">
+            <a:avLst/>
+          </a:prstGeom>
+          <a:solidFill>
+            <a:schemeClr val="accent1">
+              <a:lumMod val="20000"/>
+              <a:lumOff val="80000"/>
+            </a:schemeClr>
+          </a:solidFill>
+        </p:spPr>
+        <p:style>
+          <a:lnRef idx="2">
+            <a:schemeClr val="accent1">
+              <a:shade val="50000"/>
+            </a:schemeClr>
+          </a:lnRef>
+          <a:fillRef idx="1">
+            <a:schemeClr val="accent1"/>
+          </a:fillRef>
+          <a:effectRef idx="0">
+            <a:schemeClr val="accent1"/>
+          </a:effectRef>
+          <a:fontRef idx="minor">
+            <a:schemeClr val="lt1"/>
+          </a:fontRef>
+        </p:style>
+        <p:txBody>
+          <a:bodyPr rtlCol="0" anchor="ctr"/>
+          <a:lstStyle/>
+          <a:p>
+            <a:pPr algn="ctr"/>
+            <a:r>
+              <a:rPr lang="es-MX" sz="1200" dirty="0" smtClean="0">
                 <a:solidFill>
                   <a:schemeClr val="tx1"/>
                 </a:solidFill>
               </a:rPr>
-              <a:t>5</a:t>
-            </a:r>
-            <a:endParaRPr lang="es-ES" dirty="0">
+              <a:t>Firmar</a:t>
+            </a:r>
+            <a:endParaRPr lang="es-MX" sz="1200" dirty="0">
               <a:solidFill>
                 <a:schemeClr val="tx1"/>
               </a:solidFill>
@@ -5852,13 +6060,305 @@
       </p:sp>
       <p:sp>
         <p:nvSpPr>
-          <p:cNvPr id="54" name="Rectángulo 53"/>
+          <p:cNvPr id="63" name="Rectángulo redondeado 62">
+            <a:hlinkClick r:id="rId5" action="ppaction://hlinksldjump"/>
+          </p:cNvPr>
           <p:cNvSpPr/>
           <p:nvPr/>
         </p:nvSpPr>
         <p:spPr>
           <a:xfrm>
-            <a:off x="218766" y="3915898"/>
+            <a:off x="5100722" y="6213453"/>
+            <a:ext cx="1629634" cy="373782"/>
+          </a:xfrm>
+          <a:prstGeom prst="roundRect">
+            <a:avLst/>
+          </a:prstGeom>
+          <a:solidFill>
+            <a:schemeClr val="accent1">
+              <a:lumMod val="20000"/>
+              <a:lumOff val="80000"/>
+            </a:schemeClr>
+          </a:solidFill>
+        </p:spPr>
+        <p:style>
+          <a:lnRef idx="2">
+            <a:schemeClr val="accent1">
+              <a:shade val="50000"/>
+            </a:schemeClr>
+          </a:lnRef>
+          <a:fillRef idx="1">
+            <a:schemeClr val="accent1"/>
+          </a:fillRef>
+          <a:effectRef idx="0">
+            <a:schemeClr val="accent1"/>
+          </a:effectRef>
+          <a:fontRef idx="minor">
+            <a:schemeClr val="lt1"/>
+          </a:fontRef>
+        </p:style>
+        <p:txBody>
+          <a:bodyPr rtlCol="0" anchor="ctr"/>
+          <a:lstStyle/>
+          <a:p>
+            <a:pPr algn="ctr"/>
+            <a:r>
+              <a:rPr lang="es-MX" sz="1200" dirty="0" smtClean="0">
+                <a:solidFill>
+                  <a:schemeClr val="tx1"/>
+                </a:solidFill>
+              </a:rPr>
+              <a:t>Previsualizar</a:t>
+            </a:r>
+            <a:endParaRPr lang="es-MX" sz="1200" dirty="0">
+              <a:solidFill>
+                <a:schemeClr val="tx1"/>
+              </a:solidFill>
+            </a:endParaRPr>
+          </a:p>
+        </p:txBody>
+      </p:sp>
+      <p:sp>
+        <p:nvSpPr>
+          <p:cNvPr id="30" name="Rectángulo redondeado 29">
+            <a:hlinkClick r:id="rId5" action="ppaction://hlinksldjump"/>
+          </p:cNvPr>
+          <p:cNvSpPr/>
+          <p:nvPr/>
+        </p:nvSpPr>
+        <p:spPr>
+          <a:xfrm>
+            <a:off x="3851564" y="6225114"/>
+            <a:ext cx="1161348" cy="373782"/>
+          </a:xfrm>
+          <a:prstGeom prst="roundRect">
+            <a:avLst/>
+          </a:prstGeom>
+          <a:solidFill>
+            <a:schemeClr val="accent1">
+              <a:lumMod val="20000"/>
+              <a:lumOff val="80000"/>
+            </a:schemeClr>
+          </a:solidFill>
+        </p:spPr>
+        <p:style>
+          <a:lnRef idx="2">
+            <a:schemeClr val="accent1">
+              <a:shade val="50000"/>
+            </a:schemeClr>
+          </a:lnRef>
+          <a:fillRef idx="1">
+            <a:schemeClr val="accent1"/>
+          </a:fillRef>
+          <a:effectRef idx="0">
+            <a:schemeClr val="accent1"/>
+          </a:effectRef>
+          <a:fontRef idx="minor">
+            <a:schemeClr val="lt1"/>
+          </a:fontRef>
+        </p:style>
+        <p:txBody>
+          <a:bodyPr rtlCol="0" anchor="ctr"/>
+          <a:lstStyle/>
+          <a:p>
+            <a:pPr algn="ctr"/>
+            <a:r>
+              <a:rPr lang="es-MX" sz="1200" dirty="0" smtClean="0">
+                <a:solidFill>
+                  <a:schemeClr val="tx1"/>
+                </a:solidFill>
+              </a:rPr>
+              <a:t>Guardar</a:t>
+            </a:r>
+            <a:endParaRPr lang="es-MX" sz="1200" dirty="0">
+              <a:solidFill>
+                <a:schemeClr val="tx1"/>
+              </a:solidFill>
+            </a:endParaRPr>
+          </a:p>
+        </p:txBody>
+      </p:sp>
+      <p:sp>
+        <p:nvSpPr>
+          <p:cNvPr id="28" name="CuadroTexto 27"/>
+          <p:cNvSpPr txBox="1"/>
+          <p:nvPr/>
+        </p:nvSpPr>
+        <p:spPr>
+          <a:xfrm>
+            <a:off x="112358" y="437549"/>
+            <a:ext cx="2381317" cy="276999"/>
+          </a:xfrm>
+          <a:prstGeom prst="rect">
+            <a:avLst/>
+          </a:prstGeom>
+          <a:noFill/>
+        </p:spPr>
+        <p:txBody>
+          <a:bodyPr wrap="square" rtlCol="0">
+            <a:spAutoFit/>
+          </a:bodyPr>
+          <a:lstStyle/>
+          <a:p>
+            <a:r>
+              <a:rPr lang="es-MX" sz="1200" dirty="0" smtClean="0"/>
+              <a:t>Número de título de autorización :</a:t>
+            </a:r>
+            <a:endParaRPr lang="es-MX" sz="1200" dirty="0"/>
+          </a:p>
+        </p:txBody>
+      </p:sp>
+      <p:sp>
+        <p:nvSpPr>
+          <p:cNvPr id="32" name="CuadroTexto 31"/>
+          <p:cNvSpPr txBox="1"/>
+          <p:nvPr/>
+        </p:nvSpPr>
+        <p:spPr>
+          <a:xfrm>
+            <a:off x="2691814" y="460367"/>
+            <a:ext cx="2683750" cy="276999"/>
+          </a:xfrm>
+          <a:prstGeom prst="rect">
+            <a:avLst/>
+          </a:prstGeom>
+          <a:noFill/>
+        </p:spPr>
+        <p:txBody>
+          <a:bodyPr wrap="square" rtlCol="0">
+            <a:spAutoFit/>
+          </a:bodyPr>
+          <a:lstStyle/>
+          <a:p>
+            <a:r>
+              <a:rPr lang="es-MX" sz="1200" dirty="0" smtClean="0"/>
+              <a:t>Fecha de inicio de la cancelación:</a:t>
+            </a:r>
+            <a:endParaRPr lang="es-MX" sz="1200" dirty="0"/>
+          </a:p>
+        </p:txBody>
+      </p:sp>
+      <p:sp>
+        <p:nvSpPr>
+          <p:cNvPr id="34" name="CuadroTexto 33"/>
+          <p:cNvSpPr txBox="1"/>
+          <p:nvPr/>
+        </p:nvSpPr>
+        <p:spPr>
+          <a:xfrm>
+            <a:off x="5656685" y="445587"/>
+            <a:ext cx="2683750" cy="276999"/>
+          </a:xfrm>
+          <a:prstGeom prst="rect">
+            <a:avLst/>
+          </a:prstGeom>
+          <a:noFill/>
+        </p:spPr>
+        <p:txBody>
+          <a:bodyPr wrap="square" rtlCol="0">
+            <a:spAutoFit/>
+          </a:bodyPr>
+          <a:lstStyle/>
+          <a:p>
+            <a:r>
+              <a:rPr lang="es-MX" sz="1200" dirty="0" smtClean="0"/>
+              <a:t>Estado:</a:t>
+            </a:r>
+            <a:endParaRPr lang="es-MX" sz="1200" dirty="0"/>
+          </a:p>
+        </p:txBody>
+      </p:sp>
+      <p:sp>
+        <p:nvSpPr>
+          <p:cNvPr id="37" name="CuadroTexto 36"/>
+          <p:cNvSpPr txBox="1"/>
+          <p:nvPr/>
+        </p:nvSpPr>
+        <p:spPr>
+          <a:xfrm>
+            <a:off x="7631562" y="434435"/>
+            <a:ext cx="2683750" cy="276999"/>
+          </a:xfrm>
+          <a:prstGeom prst="rect">
+            <a:avLst/>
+          </a:prstGeom>
+          <a:noFill/>
+        </p:spPr>
+        <p:txBody>
+          <a:bodyPr wrap="square" rtlCol="0">
+            <a:spAutoFit/>
+          </a:bodyPr>
+          <a:lstStyle/>
+          <a:p>
+            <a:r>
+              <a:rPr lang="es-MX" sz="1200" dirty="0" smtClean="0"/>
+              <a:t>Días transcurridos:</a:t>
+            </a:r>
+            <a:endParaRPr lang="es-MX" sz="1200" dirty="0"/>
+          </a:p>
+        </p:txBody>
+      </p:sp>
+      <p:sp>
+        <p:nvSpPr>
+          <p:cNvPr id="35" name="Rectángulo 34"/>
+          <p:cNvSpPr/>
+          <p:nvPr/>
+        </p:nvSpPr>
+        <p:spPr>
+          <a:xfrm>
+            <a:off x="1760692" y="4809073"/>
+            <a:ext cx="2769599" cy="276999"/>
+          </a:xfrm>
+          <a:prstGeom prst="rect">
+            <a:avLst/>
+          </a:prstGeom>
+          <a:solidFill>
+            <a:schemeClr val="bg1">
+              <a:lumMod val="85000"/>
+            </a:schemeClr>
+          </a:solidFill>
+          <a:ln>
+            <a:solidFill>
+              <a:schemeClr val="bg1">
+                <a:lumMod val="95000"/>
+              </a:schemeClr>
+            </a:solidFill>
+          </a:ln>
+        </p:spPr>
+        <p:style>
+          <a:lnRef idx="2">
+            <a:schemeClr val="accent1">
+              <a:shade val="50000"/>
+            </a:schemeClr>
+          </a:lnRef>
+          <a:fillRef idx="1">
+            <a:schemeClr val="accent1"/>
+          </a:fillRef>
+          <a:effectRef idx="0">
+            <a:schemeClr val="accent1"/>
+          </a:effectRef>
+          <a:fontRef idx="minor">
+            <a:schemeClr val="lt1"/>
+          </a:fontRef>
+        </p:style>
+        <p:txBody>
+          <a:bodyPr rtlCol="0" anchor="ctr"/>
+          <a:lstStyle/>
+          <a:p>
+            <a:pPr algn="ctr"/>
+            <a:endParaRPr lang="es-ES"/>
+          </a:p>
+        </p:txBody>
+      </p:sp>
+      <p:sp>
+        <p:nvSpPr>
+          <p:cNvPr id="38" name="Rectángulo 37"/>
+          <p:cNvSpPr/>
+          <p:nvPr/>
+        </p:nvSpPr>
+        <p:spPr>
+          <a:xfrm>
+            <a:off x="288041" y="5384349"/>
             <a:ext cx="11384170" cy="711314"/>
           </a:xfrm>
           <a:prstGeom prst="rect">
@@ -5898,557 +6398,11 @@
           </a:p>
         </p:txBody>
       </p:sp>
-      <p:sp>
-        <p:nvSpPr>
-          <p:cNvPr id="55" name="CuadroTexto 54"/>
-          <p:cNvSpPr txBox="1"/>
-          <p:nvPr/>
-        </p:nvSpPr>
-        <p:spPr>
-          <a:xfrm>
-            <a:off x="215404" y="4809074"/>
-            <a:ext cx="3082834" cy="276999"/>
-          </a:xfrm>
-          <a:prstGeom prst="rect">
-            <a:avLst/>
-          </a:prstGeom>
-          <a:noFill/>
-        </p:spPr>
-        <p:txBody>
-          <a:bodyPr wrap="square" rtlCol="0">
-            <a:spAutoFit/>
-          </a:bodyPr>
-          <a:lstStyle/>
-          <a:p>
-            <a:r>
-              <a:rPr lang="es-MX" sz="1200" dirty="0" smtClean="0"/>
-              <a:t>Número de oficio </a:t>
-            </a:r>
-            <a:endParaRPr lang="es-MX" sz="1200" dirty="0"/>
-          </a:p>
-        </p:txBody>
-      </p:sp>
-      <p:sp>
-        <p:nvSpPr>
-          <p:cNvPr id="56" name="CuadroTexto 55"/>
-          <p:cNvSpPr txBox="1"/>
-          <p:nvPr/>
-        </p:nvSpPr>
-        <p:spPr>
-          <a:xfrm>
-            <a:off x="4712395" y="4799871"/>
-            <a:ext cx="2284150" cy="461665"/>
-          </a:xfrm>
-          <a:prstGeom prst="rect">
-            <a:avLst/>
-          </a:prstGeom>
-          <a:noFill/>
-        </p:spPr>
-        <p:txBody>
-          <a:bodyPr wrap="square" rtlCol="0">
-            <a:spAutoFit/>
-          </a:bodyPr>
-          <a:lstStyle/>
-          <a:p>
-            <a:r>
-              <a:rPr lang="es-MX" sz="1200" dirty="0" smtClean="0"/>
-              <a:t>Fecha de vencimiento de la prórroga</a:t>
-            </a:r>
-            <a:endParaRPr lang="es-MX" sz="1200" dirty="0"/>
-          </a:p>
-        </p:txBody>
-      </p:sp>
-      <p:sp>
-        <p:nvSpPr>
-          <p:cNvPr id="57" name="Rectángulo 56"/>
-          <p:cNvSpPr/>
-          <p:nvPr/>
-        </p:nvSpPr>
-        <p:spPr>
-          <a:xfrm>
-            <a:off x="6771059" y="4777380"/>
-            <a:ext cx="2769599" cy="276999"/>
-          </a:xfrm>
-          <a:prstGeom prst="rect">
-            <a:avLst/>
-          </a:prstGeom>
-          <a:solidFill>
-            <a:schemeClr val="bg1">
-              <a:lumMod val="85000"/>
-            </a:schemeClr>
-          </a:solidFill>
-          <a:ln>
-            <a:solidFill>
-              <a:schemeClr val="bg1">
-                <a:lumMod val="95000"/>
-              </a:schemeClr>
-            </a:solidFill>
-          </a:ln>
-        </p:spPr>
-        <p:style>
-          <a:lnRef idx="2">
-            <a:schemeClr val="accent1">
-              <a:shade val="50000"/>
-            </a:schemeClr>
-          </a:lnRef>
-          <a:fillRef idx="1">
-            <a:schemeClr val="accent1"/>
-          </a:fillRef>
-          <a:effectRef idx="0">
-            <a:schemeClr val="accent1"/>
-          </a:effectRef>
-          <a:fontRef idx="minor">
-            <a:schemeClr val="lt1"/>
-          </a:fontRef>
-        </p:style>
-        <p:txBody>
-          <a:bodyPr rtlCol="0" anchor="ctr"/>
-          <a:lstStyle/>
-          <a:p>
-            <a:pPr algn="ctr"/>
-            <a:endParaRPr lang="es-ES"/>
-          </a:p>
-        </p:txBody>
-      </p:sp>
-      <p:sp>
-        <p:nvSpPr>
-          <p:cNvPr id="58" name="Rectángulo 57"/>
-          <p:cNvSpPr/>
-          <p:nvPr/>
-        </p:nvSpPr>
-        <p:spPr>
-          <a:xfrm>
-            <a:off x="1669737" y="4792309"/>
-            <a:ext cx="2769599" cy="276999"/>
-          </a:xfrm>
-          <a:prstGeom prst="rect">
-            <a:avLst/>
-          </a:prstGeom>
-          <a:solidFill>
-            <a:schemeClr val="bg1">
-              <a:lumMod val="85000"/>
-            </a:schemeClr>
-          </a:solidFill>
-          <a:ln>
-            <a:solidFill>
-              <a:schemeClr val="bg1">
-                <a:lumMod val="95000"/>
-              </a:schemeClr>
-            </a:solidFill>
-          </a:ln>
-        </p:spPr>
-        <p:style>
-          <a:lnRef idx="2">
-            <a:schemeClr val="accent1">
-              <a:shade val="50000"/>
-            </a:schemeClr>
-          </a:lnRef>
-          <a:fillRef idx="1">
-            <a:schemeClr val="accent1"/>
-          </a:fillRef>
-          <a:effectRef idx="0">
-            <a:schemeClr val="accent1"/>
-          </a:effectRef>
-          <a:fontRef idx="minor">
-            <a:schemeClr val="lt1"/>
-          </a:fontRef>
-        </p:style>
-        <p:txBody>
-          <a:bodyPr rtlCol="0" anchor="ctr"/>
-          <a:lstStyle/>
-          <a:p>
-            <a:pPr algn="ctr"/>
-            <a:endParaRPr lang="es-ES"/>
-          </a:p>
-        </p:txBody>
-      </p:sp>
-      <p:sp>
-        <p:nvSpPr>
-          <p:cNvPr id="60" name="CuadroTexto 59"/>
-          <p:cNvSpPr txBox="1"/>
-          <p:nvPr/>
-        </p:nvSpPr>
-        <p:spPr>
-          <a:xfrm>
-            <a:off x="211053" y="5111960"/>
-            <a:ext cx="3662068" cy="276999"/>
-          </a:xfrm>
-          <a:prstGeom prst="rect">
-            <a:avLst/>
-          </a:prstGeom>
-          <a:noFill/>
-        </p:spPr>
-        <p:txBody>
-          <a:bodyPr wrap="square" rtlCol="0">
-            <a:spAutoFit/>
-          </a:bodyPr>
-          <a:lstStyle/>
-          <a:p>
-            <a:r>
-              <a:rPr lang="es-MX" sz="1200" dirty="0" smtClean="0"/>
-              <a:t>Respuesta de la prórroga </a:t>
-            </a:r>
-            <a:endParaRPr lang="es-MX" sz="1200" dirty="0"/>
-          </a:p>
-        </p:txBody>
-      </p:sp>
-      <p:sp>
-        <p:nvSpPr>
-          <p:cNvPr id="61" name="Rectángulo 60"/>
-          <p:cNvSpPr/>
-          <p:nvPr/>
-        </p:nvSpPr>
-        <p:spPr>
-          <a:xfrm>
-            <a:off x="246473" y="5401113"/>
-            <a:ext cx="11384170" cy="583357"/>
-          </a:xfrm>
-          <a:prstGeom prst="rect">
-            <a:avLst/>
-          </a:prstGeom>
-          <a:solidFill>
-            <a:schemeClr val="bg1">
-              <a:lumMod val="85000"/>
-            </a:schemeClr>
-          </a:solidFill>
-          <a:ln>
-            <a:solidFill>
-              <a:schemeClr val="bg1">
-                <a:lumMod val="95000"/>
-              </a:schemeClr>
-            </a:solidFill>
-          </a:ln>
-        </p:spPr>
-        <p:style>
-          <a:lnRef idx="2">
-            <a:schemeClr val="accent1">
-              <a:shade val="50000"/>
-            </a:schemeClr>
-          </a:lnRef>
-          <a:fillRef idx="1">
-            <a:schemeClr val="accent1"/>
-          </a:fillRef>
-          <a:effectRef idx="0">
-            <a:schemeClr val="accent1"/>
-          </a:effectRef>
-          <a:fontRef idx="minor">
-            <a:schemeClr val="lt1"/>
-          </a:fontRef>
-        </p:style>
-        <p:txBody>
-          <a:bodyPr rtlCol="0" anchor="ctr"/>
-          <a:lstStyle/>
-          <a:p>
-            <a:pPr algn="ctr"/>
-            <a:endParaRPr lang="es-ES"/>
-          </a:p>
-        </p:txBody>
-      </p:sp>
-      <p:sp>
-        <p:nvSpPr>
-          <p:cNvPr id="62" name="Rectángulo redondeado 61">
-            <a:hlinkClick r:id="rId4" action="ppaction://hlinksldjump"/>
-          </p:cNvPr>
-          <p:cNvSpPr/>
-          <p:nvPr/>
-        </p:nvSpPr>
-        <p:spPr>
-          <a:xfrm>
-            <a:off x="6802656" y="6158033"/>
-            <a:ext cx="1629634" cy="373782"/>
-          </a:xfrm>
-          <a:prstGeom prst="roundRect">
-            <a:avLst/>
-          </a:prstGeom>
-          <a:solidFill>
-            <a:schemeClr val="accent1">
-              <a:lumMod val="20000"/>
-              <a:lumOff val="80000"/>
-            </a:schemeClr>
-          </a:solidFill>
-        </p:spPr>
-        <p:style>
-          <a:lnRef idx="2">
-            <a:schemeClr val="accent1">
-              <a:shade val="50000"/>
-            </a:schemeClr>
-          </a:lnRef>
-          <a:fillRef idx="1">
-            <a:schemeClr val="accent1"/>
-          </a:fillRef>
-          <a:effectRef idx="0">
-            <a:schemeClr val="accent1"/>
-          </a:effectRef>
-          <a:fontRef idx="minor">
-            <a:schemeClr val="lt1"/>
-          </a:fontRef>
-        </p:style>
-        <p:txBody>
-          <a:bodyPr rtlCol="0" anchor="ctr"/>
-          <a:lstStyle/>
-          <a:p>
-            <a:pPr algn="ctr"/>
-            <a:r>
-              <a:rPr lang="es-MX" sz="1200" dirty="0" smtClean="0">
-                <a:solidFill>
-                  <a:schemeClr val="tx1"/>
-                </a:solidFill>
-              </a:rPr>
-              <a:t>Firmar</a:t>
-            </a:r>
-            <a:endParaRPr lang="es-MX" sz="1200" dirty="0">
-              <a:solidFill>
-                <a:schemeClr val="tx1"/>
-              </a:solidFill>
-            </a:endParaRPr>
-          </a:p>
-        </p:txBody>
-      </p:sp>
-      <p:sp>
-        <p:nvSpPr>
-          <p:cNvPr id="63" name="Rectángulo redondeado 62">
-            <a:hlinkClick r:id="rId4" action="ppaction://hlinksldjump"/>
-          </p:cNvPr>
-          <p:cNvSpPr/>
-          <p:nvPr/>
-        </p:nvSpPr>
-        <p:spPr>
-          <a:xfrm>
-            <a:off x="5100722" y="6158033"/>
-            <a:ext cx="1629634" cy="373782"/>
-          </a:xfrm>
-          <a:prstGeom prst="roundRect">
-            <a:avLst/>
-          </a:prstGeom>
-          <a:solidFill>
-            <a:schemeClr val="accent1">
-              <a:lumMod val="20000"/>
-              <a:lumOff val="80000"/>
-            </a:schemeClr>
-          </a:solidFill>
-        </p:spPr>
-        <p:style>
-          <a:lnRef idx="2">
-            <a:schemeClr val="accent1">
-              <a:shade val="50000"/>
-            </a:schemeClr>
-          </a:lnRef>
-          <a:fillRef idx="1">
-            <a:schemeClr val="accent1"/>
-          </a:fillRef>
-          <a:effectRef idx="0">
-            <a:schemeClr val="accent1"/>
-          </a:effectRef>
-          <a:fontRef idx="minor">
-            <a:schemeClr val="lt1"/>
-          </a:fontRef>
-        </p:style>
-        <p:txBody>
-          <a:bodyPr rtlCol="0" anchor="ctr"/>
-          <a:lstStyle/>
-          <a:p>
-            <a:pPr algn="ctr"/>
-            <a:r>
-              <a:rPr lang="es-MX" sz="1200" dirty="0" smtClean="0">
-                <a:solidFill>
-                  <a:schemeClr val="tx1"/>
-                </a:solidFill>
-              </a:rPr>
-              <a:t>Previsualizar</a:t>
-            </a:r>
-            <a:endParaRPr lang="es-MX" sz="1200" dirty="0">
-              <a:solidFill>
-                <a:schemeClr val="tx1"/>
-              </a:solidFill>
-            </a:endParaRPr>
-          </a:p>
-        </p:txBody>
-      </p:sp>
-      <p:sp>
-        <p:nvSpPr>
-          <p:cNvPr id="30" name="Rectángulo redondeado 29">
-            <a:hlinkClick r:id="rId4" action="ppaction://hlinksldjump"/>
-          </p:cNvPr>
-          <p:cNvSpPr/>
-          <p:nvPr/>
-        </p:nvSpPr>
-        <p:spPr>
-          <a:xfrm>
-            <a:off x="3851564" y="6169694"/>
-            <a:ext cx="1161348" cy="373782"/>
-          </a:xfrm>
-          <a:prstGeom prst="roundRect">
-            <a:avLst/>
-          </a:prstGeom>
-          <a:solidFill>
-            <a:schemeClr val="accent1">
-              <a:lumMod val="20000"/>
-              <a:lumOff val="80000"/>
-            </a:schemeClr>
-          </a:solidFill>
-        </p:spPr>
-        <p:style>
-          <a:lnRef idx="2">
-            <a:schemeClr val="accent1">
-              <a:shade val="50000"/>
-            </a:schemeClr>
-          </a:lnRef>
-          <a:fillRef idx="1">
-            <a:schemeClr val="accent1"/>
-          </a:fillRef>
-          <a:effectRef idx="0">
-            <a:schemeClr val="accent1"/>
-          </a:effectRef>
-          <a:fontRef idx="minor">
-            <a:schemeClr val="lt1"/>
-          </a:fontRef>
-        </p:style>
-        <p:txBody>
-          <a:bodyPr rtlCol="0" anchor="ctr"/>
-          <a:lstStyle/>
-          <a:p>
-            <a:pPr algn="ctr"/>
-            <a:r>
-              <a:rPr lang="es-MX" sz="1200" dirty="0" smtClean="0">
-                <a:solidFill>
-                  <a:schemeClr val="tx1"/>
-                </a:solidFill>
-              </a:rPr>
-              <a:t>Guardar</a:t>
-            </a:r>
-            <a:endParaRPr lang="es-MX" sz="1200" dirty="0">
-              <a:solidFill>
-                <a:schemeClr val="tx1"/>
-              </a:solidFill>
-            </a:endParaRPr>
-          </a:p>
-        </p:txBody>
-      </p:sp>
-      <p:sp>
-        <p:nvSpPr>
-          <p:cNvPr id="28" name="CuadroTexto 27"/>
-          <p:cNvSpPr txBox="1"/>
-          <p:nvPr/>
-        </p:nvSpPr>
-        <p:spPr>
-          <a:xfrm>
-            <a:off x="112358" y="437549"/>
-            <a:ext cx="2381317" cy="276999"/>
-          </a:xfrm>
-          <a:prstGeom prst="rect">
-            <a:avLst/>
-          </a:prstGeom>
-          <a:noFill/>
-        </p:spPr>
-        <p:txBody>
-          <a:bodyPr wrap="square" rtlCol="0">
-            <a:spAutoFit/>
-          </a:bodyPr>
-          <a:lstStyle/>
-          <a:p>
-            <a:r>
-              <a:rPr lang="es-MX" sz="1200" dirty="0" smtClean="0"/>
-              <a:t>Número de título de autorización :</a:t>
-            </a:r>
-            <a:endParaRPr lang="es-MX" sz="1200" dirty="0"/>
-          </a:p>
-        </p:txBody>
-      </p:sp>
-      <p:sp>
-        <p:nvSpPr>
-          <p:cNvPr id="32" name="CuadroTexto 31"/>
-          <p:cNvSpPr txBox="1"/>
-          <p:nvPr/>
-        </p:nvSpPr>
-        <p:spPr>
-          <a:xfrm>
-            <a:off x="2691814" y="460367"/>
-            <a:ext cx="2683750" cy="276999"/>
-          </a:xfrm>
-          <a:prstGeom prst="rect">
-            <a:avLst/>
-          </a:prstGeom>
-          <a:noFill/>
-        </p:spPr>
-        <p:txBody>
-          <a:bodyPr wrap="square" rtlCol="0">
-            <a:spAutoFit/>
-          </a:bodyPr>
-          <a:lstStyle/>
-          <a:p>
-            <a:r>
-              <a:rPr lang="es-MX" sz="1200" dirty="0" smtClean="0"/>
-              <a:t>Fecha de inicio de la cancelación:</a:t>
-            </a:r>
-            <a:endParaRPr lang="es-MX" sz="1200" dirty="0"/>
-          </a:p>
-        </p:txBody>
-      </p:sp>
-      <p:sp>
-        <p:nvSpPr>
-          <p:cNvPr id="34" name="CuadroTexto 33"/>
-          <p:cNvSpPr txBox="1"/>
-          <p:nvPr/>
-        </p:nvSpPr>
-        <p:spPr>
-          <a:xfrm>
-            <a:off x="5656685" y="445587"/>
-            <a:ext cx="2683750" cy="276999"/>
-          </a:xfrm>
-          <a:prstGeom prst="rect">
-            <a:avLst/>
-          </a:prstGeom>
-          <a:noFill/>
-        </p:spPr>
-        <p:txBody>
-          <a:bodyPr wrap="square" rtlCol="0">
-            <a:spAutoFit/>
-          </a:bodyPr>
-          <a:lstStyle/>
-          <a:p>
-            <a:r>
-              <a:rPr lang="es-MX" sz="1200" dirty="0" smtClean="0"/>
-              <a:t>Estado:</a:t>
-            </a:r>
-            <a:endParaRPr lang="es-MX" sz="1200" dirty="0"/>
-          </a:p>
-        </p:txBody>
-      </p:sp>
-      <p:sp>
-        <p:nvSpPr>
-          <p:cNvPr id="37" name="CuadroTexto 36"/>
-          <p:cNvSpPr txBox="1"/>
-          <p:nvPr/>
-        </p:nvSpPr>
-        <p:spPr>
-          <a:xfrm>
-            <a:off x="7631562" y="434435"/>
-            <a:ext cx="2683750" cy="276999"/>
-          </a:xfrm>
-          <a:prstGeom prst="rect">
-            <a:avLst/>
-          </a:prstGeom>
-          <a:noFill/>
-        </p:spPr>
-        <p:txBody>
-          <a:bodyPr wrap="square" rtlCol="0">
-            <a:spAutoFit/>
-          </a:bodyPr>
-          <a:lstStyle/>
-          <a:p>
-            <a:r>
-              <a:rPr lang="es-MX" sz="1200" dirty="0" smtClean="0"/>
-              <a:t>Días transcurridos:</a:t>
-            </a:r>
-            <a:endParaRPr lang="es-MX" sz="1200" dirty="0"/>
-          </a:p>
-        </p:txBody>
-      </p:sp>
     </p:spTree>
     <p:controls>
       <mc:AlternateContent xmlns:mc="http://schemas.openxmlformats.org/markup-compatibility/2006">
         <mc:Choice xmlns:v="urn:schemas-microsoft-com:vml" Requires="v">
-          <p:control spid="8407" name="ListBox2" r:id="rId2" imgW="11430000" imgH="609480"/>
+          <p:control spid="8412" name="ListBox2" r:id="rId2" imgW="11430000" imgH="609480"/>
         </mc:Choice>
         <mc:Fallback>
           <p:control name="ListBox2" r:id="rId2" imgW="11430000" imgH="609480">
@@ -6461,7 +6415,7 @@
                 <p:nvPr/>
               </p:nvPicPr>
               <p:blipFill>
-                <a:blip r:embed="rId5"/>
+                <a:blip r:embed="rId6"/>
                 <a:stretch>
                   <a:fillRect/>
                 </a:stretch>
@@ -6469,6 +6423,39 @@
               <p:spPr>
                 <a:xfrm>
                   <a:off x="169816" y="1727349"/>
+                  <a:ext cx="11432653" cy="609302"/>
+                </a:xfrm>
+                <a:prstGeom prst="rect">
+                  <a:avLst/>
+                </a:prstGeom>
+              </p:spPr>
+            </p:pic>
+          </p:control>
+        </mc:Fallback>
+      </mc:AlternateContent>
+      <mc:AlternateContent xmlns:mc="http://schemas.openxmlformats.org/markup-compatibility/2006">
+        <mc:Choice xmlns:v="urn:schemas-microsoft-com:vml" Requires="v">
+          <p:control spid="8413" name="ListBox1" r:id="rId3" imgW="11430000" imgH="609480"/>
+        </mc:Choice>
+        <mc:Fallback>
+          <p:control name="ListBox1" r:id="rId3" imgW="11430000" imgH="609480">
+            <p:pic>
+              <p:nvPicPr>
+                <p:cNvPr id="40" name="ListBox1"/>
+                <p:cNvPicPr>
+                  <a:picLocks/>
+                </p:cNvPicPr>
+                <p:nvPr/>
+              </p:nvPicPr>
+              <p:blipFill>
+                <a:blip r:embed="rId6"/>
+                <a:stretch>
+                  <a:fillRect/>
+                </a:stretch>
+              </p:blipFill>
+              <p:spPr>
+                <a:xfrm>
+                  <a:off x="215404" y="3930814"/>
                   <a:ext cx="11432653" cy="609302"/>
                 </a:xfrm>
                 <a:prstGeom prst="rect">
@@ -6574,7 +6561,7 @@
         </p:nvSpPr>
         <p:spPr>
           <a:xfrm>
-            <a:off x="3814921" y="1377647"/>
+            <a:off x="5260757" y="1417674"/>
             <a:ext cx="1789216" cy="327841"/>
           </a:xfrm>
           <a:prstGeom prst="roundRect">
@@ -6709,7 +6696,7 @@
         </p:nvSpPr>
         <p:spPr>
           <a:xfrm>
-            <a:off x="414599" y="4295792"/>
+            <a:off x="414599" y="4365067"/>
             <a:ext cx="2561709" cy="276999"/>
           </a:xfrm>
           <a:prstGeom prst="rect">
@@ -6854,7 +6841,7 @@
         </p:nvSpPr>
         <p:spPr>
           <a:xfrm>
-            <a:off x="2293961" y="803135"/>
+            <a:off x="2875856" y="858553"/>
             <a:ext cx="2561709" cy="276999"/>
           </a:xfrm>
           <a:prstGeom prst="rect">
@@ -6885,14 +6872,14 @@
           <p:nvPr>
             <p:extLst>
               <p:ext uri="{D42A27DB-BD31-4B8C-83A1-F6EECF244321}">
-                <p14:modId xmlns:p14="http://schemas.microsoft.com/office/powerpoint/2010/main" val="3183572052"/>
+                <p14:modId xmlns:p14="http://schemas.microsoft.com/office/powerpoint/2010/main" val="2463864553"/>
               </p:ext>
             </p:extLst>
           </p:nvPr>
         </p:nvGraphicFramePr>
         <p:xfrm>
           <a:off x="450182" y="1920480"/>
-          <a:ext cx="9746762" cy="1961564"/>
+          <a:ext cx="11156055" cy="1961564"/>
         </p:xfrm>
         <a:graphic>
           <a:graphicData uri="http://schemas.openxmlformats.org/drawingml/2006/table">
@@ -6901,35 +6888,35 @@
                 <a:tableStyleId>{C083E6E3-FA7D-4D7B-A595-EF9225AFEA82}</a:tableStyleId>
               </a:tblPr>
               <a:tblGrid>
-                <a:gridCol w="1703844">
+                <a:gridCol w="1950204">
                   <a:extLst>
                     <a:ext uri="{9D8B030D-6E8A-4147-A177-3AD203B41FA5}">
                       <a16:colId xmlns:a16="http://schemas.microsoft.com/office/drawing/2014/main" val="1794950014"/>
                     </a:ext>
                   </a:extLst>
                 </a:gridCol>
-                <a:gridCol w="2030047">
+                <a:gridCol w="975661">
                   <a:extLst>
                     <a:ext uri="{9D8B030D-6E8A-4147-A177-3AD203B41FA5}">
                       <a16:colId xmlns:a16="http://schemas.microsoft.com/office/drawing/2014/main" val="585726316"/>
                     </a:ext>
                   </a:extLst>
                 </a:gridCol>
-                <a:gridCol w="1406102">
+                <a:gridCol w="2957324">
                   <a:extLst>
                     <a:ext uri="{9D8B030D-6E8A-4147-A177-3AD203B41FA5}">
                       <a16:colId xmlns:a16="http://schemas.microsoft.com/office/drawing/2014/main" val="3740532052"/>
                     </a:ext>
                   </a:extLst>
                 </a:gridCol>
-                <a:gridCol w="2493744">
+                <a:gridCol w="2854317">
                   <a:extLst>
                     <a:ext uri="{9D8B030D-6E8A-4147-A177-3AD203B41FA5}">
                       <a16:colId xmlns:a16="http://schemas.microsoft.com/office/drawing/2014/main" val="2087492398"/>
                     </a:ext>
                   </a:extLst>
                 </a:gridCol>
-                <a:gridCol w="2113025">
+                <a:gridCol w="2418549">
                   <a:extLst>
                     <a:ext uri="{9D8B030D-6E8A-4147-A177-3AD203B41FA5}">
                       <a16:colId xmlns:a16="http://schemas.microsoft.com/office/drawing/2014/main" val="358821484"/>
@@ -6950,7 +6937,23 @@
                             <a:schemeClr val="tx1"/>
                           </a:solidFill>
                         </a:rPr>
-                        <a:t>Nombre de Documento</a:t>
+                        <a:t>Nombre </a:t>
+                      </a:r>
+                      <a:r>
+                        <a:rPr lang="es-MX" sz="1200" b="0" dirty="0" smtClean="0">
+                          <a:solidFill>
+                            <a:schemeClr val="tx1"/>
+                          </a:solidFill>
+                        </a:rPr>
+                        <a:t>del </a:t>
+                      </a:r>
+                      <a:r>
+                        <a:rPr lang="es-MX" sz="1200" b="0" dirty="0" smtClean="0">
+                          <a:solidFill>
+                            <a:schemeClr val="tx1"/>
+                          </a:solidFill>
+                        </a:rPr>
+                        <a:t>Documento</a:t>
                       </a:r>
                       <a:r>
                         <a:rPr lang="es-MX" sz="1200" b="0" baseline="0" dirty="0" smtClean="0">
@@ -6975,14 +6978,6 @@
                     <a:lstStyle/>
                     <a:p>
                       <a:pPr algn="l"/>
-                      <a:r>
-                        <a:rPr lang="es-MX" sz="1200" b="0" dirty="0" smtClean="0">
-                          <a:solidFill>
-                            <a:schemeClr val="tx1"/>
-                          </a:solidFill>
-                        </a:rPr>
-                        <a:t>Tipo de Documento</a:t>
-                      </a:r>
                       <a:endParaRPr lang="es-MX" sz="1200" b="0" dirty="0">
                         <a:solidFill>
                           <a:schemeClr val="tx1"/>
@@ -7020,8 +7015,21 @@
                             <a:schemeClr val="tx1"/>
                           </a:solidFill>
                         </a:rPr>
-                        <a:t>Fecha de Carga</a:t>
+                        <a:t>Fecha de </a:t>
                       </a:r>
+                      <a:r>
+                        <a:rPr lang="es-MX" sz="1200" b="0" dirty="0" smtClean="0">
+                          <a:solidFill>
+                            <a:schemeClr val="tx1"/>
+                          </a:solidFill>
+                        </a:rPr>
+                        <a:t>Carga del documento</a:t>
+                      </a:r>
+                      <a:endParaRPr lang="es-MX" sz="1200" b="0" dirty="0" smtClean="0">
+                        <a:solidFill>
+                          <a:schemeClr val="tx1"/>
+                        </a:solidFill>
+                      </a:endParaRPr>
                     </a:p>
                     <a:p>
                       <a:pPr algn="l"/>
@@ -7040,14 +7048,11 @@
                     <a:lstStyle/>
                     <a:p>
                       <a:pPr algn="l"/>
-                      <a:r>
-                        <a:rPr lang="es-MX" sz="1200" b="0" dirty="0" smtClean="0">
-                          <a:solidFill>
-                            <a:schemeClr val="tx1"/>
-                          </a:solidFill>
-                        </a:rPr>
-                        <a:t>Comentario</a:t>
-                      </a:r>
+                      <a:endParaRPr lang="es-MX" sz="1200" b="0" dirty="0" smtClean="0">
+                        <a:solidFill>
+                          <a:schemeClr val="tx1"/>
+                        </a:solidFill>
+                      </a:endParaRPr>
                     </a:p>
                   </a:txBody>
                   <a:tcPr/>
@@ -7101,10 +7106,6 @@
                     <a:bodyPr/>
                     <a:lstStyle/>
                     <a:p>
-                      <a:r>
-                        <a:rPr lang="es-MX" sz="1400" dirty="0" smtClean="0"/>
-                        <a:t>Información Contable</a:t>
-                      </a:r>
                       <a:endParaRPr lang="es-MX" sz="1400" dirty="0"/>
                     </a:p>
                   </a:txBody>
@@ -7341,7 +7342,7 @@
         </p:nvSpPr>
         <p:spPr>
           <a:xfrm>
-            <a:off x="5564134" y="824312"/>
+            <a:off x="6547809" y="824312"/>
             <a:ext cx="2561709" cy="276999"/>
           </a:xfrm>
           <a:prstGeom prst="rect">
@@ -7371,7 +7372,7 @@
         </p:nvSpPr>
         <p:spPr>
           <a:xfrm>
-            <a:off x="3965763" y="801027"/>
+            <a:off x="4547658" y="856445"/>
             <a:ext cx="1487533" cy="308301"/>
           </a:xfrm>
           <a:prstGeom prst="roundRect">
@@ -7422,7 +7423,7 @@
         </p:nvSpPr>
         <p:spPr>
           <a:xfrm>
-            <a:off x="7718827" y="807142"/>
+            <a:off x="8702502" y="807142"/>
             <a:ext cx="1487533" cy="308301"/>
           </a:xfrm>
           <a:prstGeom prst="roundRect">
@@ -7477,7 +7478,7 @@
         </p:nvSpPr>
         <p:spPr>
           <a:xfrm>
-            <a:off x="8961597" y="2430273"/>
+            <a:off x="9709746" y="2444128"/>
             <a:ext cx="1104961" cy="303036"/>
           </a:xfrm>
           <a:prstGeom prst="roundRect">
@@ -7537,7 +7538,7 @@
         </p:nvSpPr>
         <p:spPr>
           <a:xfrm>
-            <a:off x="8961597" y="2845631"/>
+            <a:off x="9723601" y="2817921"/>
             <a:ext cx="1104961" cy="303036"/>
           </a:xfrm>
           <a:prstGeom prst="roundRect">
@@ -7597,7 +7598,7 @@
         </p:nvSpPr>
         <p:spPr>
           <a:xfrm>
-            <a:off x="8967292" y="3248540"/>
+            <a:off x="9715441" y="3193120"/>
             <a:ext cx="1104961" cy="303036"/>
           </a:xfrm>
           <a:prstGeom prst="roundRect">
@@ -7717,7 +7718,7 @@
         </p:nvSpPr>
         <p:spPr>
           <a:xfrm>
-            <a:off x="7807657" y="2428851"/>
+            <a:off x="8555806" y="2414996"/>
             <a:ext cx="939238" cy="316877"/>
           </a:xfrm>
           <a:prstGeom prst="roundRect">
@@ -7757,7 +7758,7 @@
                   <a:schemeClr val="tx1"/>
                 </a:solidFill>
               </a:rPr>
-              <a:t>Previsualizar</a:t>
+              <a:t>Visualizar</a:t>
             </a:r>
             <a:endParaRPr lang="es-MX" sz="1000" dirty="0">
               <a:solidFill>
@@ -7777,7 +7778,7 @@
         </p:nvSpPr>
         <p:spPr>
           <a:xfrm>
-            <a:off x="7812367" y="2845631"/>
+            <a:off x="8560516" y="2804066"/>
             <a:ext cx="939238" cy="316877"/>
           </a:xfrm>
           <a:prstGeom prst="roundRect">
@@ -7817,7 +7818,7 @@
                   <a:schemeClr val="tx1"/>
                 </a:solidFill>
               </a:rPr>
-              <a:t>Previsualizar</a:t>
+              <a:t>Visualizar</a:t>
             </a:r>
             <a:endParaRPr lang="es-MX" sz="1000" dirty="0">
               <a:solidFill>
@@ -7837,7 +7838,7 @@
         </p:nvSpPr>
         <p:spPr>
           <a:xfrm>
-            <a:off x="7812367" y="3257360"/>
+            <a:off x="8560516" y="3174230"/>
             <a:ext cx="939238" cy="316877"/>
           </a:xfrm>
           <a:prstGeom prst="roundRect">
@@ -7877,7 +7878,7 @@
                   <a:schemeClr val="tx1"/>
                 </a:solidFill>
               </a:rPr>
-              <a:t>Previsualizar</a:t>
+              <a:t>Visualizar </a:t>
             </a:r>
             <a:endParaRPr lang="es-MX" sz="1000" dirty="0">
               <a:solidFill>
@@ -7951,10 +7952,10 @@
     <p:controls>
       <mc:AlternateContent xmlns:mc="http://schemas.openxmlformats.org/markup-compatibility/2006">
         <mc:Choice xmlns:v="urn:schemas-microsoft-com:vml" Requires="v">
-          <p:control spid="35943" name="ListBox3" r:id="rId2" imgW="11115720" imgH="752400"/>
+          <p:control spid="35947" name="ListBox3" r:id="rId2" imgW="11115720" imgH="847800"/>
         </mc:Choice>
         <mc:Fallback>
-          <p:control name="ListBox3" r:id="rId2" imgW="11115720" imgH="752400">
+          <p:control name="ListBox3" r:id="rId2" imgW="11115720" imgH="847800">
             <p:pic>
               <p:nvPicPr>
                 <p:cNvPr id="34" name="ListBox3"/>
@@ -7972,7 +7973,7 @@
               <p:spPr>
                 <a:xfrm>
                   <a:off x="495163" y="4685589"/>
-                  <a:ext cx="11111075" cy="753373"/>
+                  <a:ext cx="11111075" cy="844236"/>
                 </a:xfrm>
                 <a:prstGeom prst="rect">
                   <a:avLst/>
@@ -8999,7 +9000,7 @@
     <p:controls>
       <mc:AlternateContent xmlns:mc="http://schemas.openxmlformats.org/markup-compatibility/2006">
         <mc:Choice xmlns:v="urn:schemas-microsoft-com:vml" Requires="v">
-          <p:control spid="32937" name="ListBox3" r:id="rId2" imgW="11115720" imgH="695160"/>
+          <p:control spid="32949" name="ListBox3" r:id="rId2" imgW="11115720" imgH="695160"/>
         </mc:Choice>
         <mc:Fallback>
           <p:control name="ListBox3" r:id="rId2" imgW="11115720" imgH="695160">
@@ -9032,7 +9033,7 @@
       </mc:AlternateContent>
       <mc:AlternateContent xmlns:mc="http://schemas.openxmlformats.org/markup-compatibility/2006">
         <mc:Choice xmlns:v="urn:schemas-microsoft-com:vml" Requires="v">
-          <p:control spid="32938" name="CheckBox1" r:id="rId3" imgW="2076480" imgH="419040"/>
+          <p:control spid="32950" name="CheckBox1" r:id="rId3" imgW="2076480" imgH="419040"/>
         </mc:Choice>
         <mc:Fallback>
           <p:control name="CheckBox1" r:id="rId3" imgW="2076480" imgH="419040">
@@ -9065,7 +9066,7 @@
       </mc:AlternateContent>
       <mc:AlternateContent xmlns:mc="http://schemas.openxmlformats.org/markup-compatibility/2006">
         <mc:Choice xmlns:v="urn:schemas-microsoft-com:vml" Requires="v">
-          <p:control spid="32939" name="CheckBox2" r:id="rId4" imgW="2066760" imgH="352440"/>
+          <p:control spid="32951" name="CheckBox2" r:id="rId4" imgW="2066760" imgH="352440"/>
         </mc:Choice>
         <mc:Fallback>
           <p:control name="CheckBox2" r:id="rId4" imgW="2066760" imgH="352440">
@@ -9098,7 +9099,7 @@
       </mc:AlternateContent>
       <mc:AlternateContent xmlns:mc="http://schemas.openxmlformats.org/markup-compatibility/2006">
         <mc:Choice xmlns:v="urn:schemas-microsoft-com:vml" Requires="v">
-          <p:control spid="32940" name="CheckBox5" r:id="rId5" imgW="1990800" imgH="352440"/>
+          <p:control spid="32952" name="CheckBox5" r:id="rId5" imgW="1990800" imgH="352440"/>
         </mc:Choice>
         <mc:Fallback>
           <p:control name="CheckBox5" r:id="rId5" imgW="1990800" imgH="352440">
@@ -10684,7 +10685,7 @@
     <p:controls>
       <mc:AlternateContent xmlns:mc="http://schemas.openxmlformats.org/markup-compatibility/2006">
         <mc:Choice xmlns:v="urn:schemas-microsoft-com:vml" Requires="v">
-          <p:control spid="33893" name="ComboBox1" r:id="rId2" imgW="1514520" imgH="314280"/>
+          <p:control spid="33902" name="ComboBox1" r:id="rId2" imgW="1514520" imgH="314280"/>
         </mc:Choice>
         <mc:Fallback>
           <p:control name="ComboBox1" r:id="rId2" imgW="1514520" imgH="314280">
@@ -10717,7 +10718,7 @@
       </mc:AlternateContent>
       <mc:AlternateContent xmlns:mc="http://schemas.openxmlformats.org/markup-compatibility/2006">
         <mc:Choice xmlns:v="urn:schemas-microsoft-com:vml" Requires="v">
-          <p:control spid="33894" name="ListBox2" r:id="rId3" imgW="2085840" imgH="295200"/>
+          <p:control spid="33903" name="ListBox2" r:id="rId3" imgW="2085840" imgH="295200"/>
         </mc:Choice>
         <mc:Fallback>
           <p:control name="ListBox2" r:id="rId3" imgW="2085840" imgH="295200">
@@ -10750,7 +10751,7 @@
       </mc:AlternateContent>
       <mc:AlternateContent xmlns:mc="http://schemas.openxmlformats.org/markup-compatibility/2006">
         <mc:Choice xmlns:v="urn:schemas-microsoft-com:vml" Requires="v">
-          <p:control spid="33895" name="ComboBox3" r:id="rId4" imgW="1628640" imgH="371520"/>
+          <p:control spid="33904" name="ComboBox3" r:id="rId4" imgW="1628640" imgH="371520"/>
         </mc:Choice>
         <mc:Fallback>
           <p:control name="ComboBox3" r:id="rId4" imgW="1628640" imgH="371520">
@@ -14889,7 +14890,7 @@
     <p:controls>
       <mc:AlternateContent xmlns:mc="http://schemas.openxmlformats.org/markup-compatibility/2006">
         <mc:Choice xmlns:v="urn:schemas-microsoft-com:vml" Requires="v">
-          <p:control spid="10916" name="ListBox1" r:id="rId2" imgW="11325240" imgH="476280"/>
+          <p:control spid="10931" name="ListBox1" r:id="rId2" imgW="11325240" imgH="476280"/>
         </mc:Choice>
         <mc:Fallback>
           <p:control name="ListBox1" r:id="rId2" imgW="11325240" imgH="476280">
@@ -14922,7 +14923,7 @@
       </mc:AlternateContent>
       <mc:AlternateContent xmlns:mc="http://schemas.openxmlformats.org/markup-compatibility/2006">
         <mc:Choice xmlns:v="urn:schemas-microsoft-com:vml" Requires="v">
-          <p:control spid="10917" name="ListBox5" r:id="rId3" imgW="11382480" imgH="380880"/>
+          <p:control spid="10932" name="ListBox5" r:id="rId3" imgW="11382480" imgH="380880"/>
         </mc:Choice>
         <mc:Fallback>
           <p:control name="ListBox5" r:id="rId3" imgW="11382480" imgH="380880">
@@ -14955,7 +14956,7 @@
       </mc:AlternateContent>
       <mc:AlternateContent xmlns:mc="http://schemas.openxmlformats.org/markup-compatibility/2006">
         <mc:Choice xmlns:v="urn:schemas-microsoft-com:vml" Requires="v">
-          <p:control spid="10918" name="CheckBox1" r:id="rId4" imgW="2076480" imgH="419040"/>
+          <p:control spid="10933" name="CheckBox1" r:id="rId4" imgW="2076480" imgH="419040"/>
         </mc:Choice>
         <mc:Fallback>
           <p:control name="CheckBox1" r:id="rId4" imgW="2076480" imgH="419040">
@@ -14988,7 +14989,7 @@
       </mc:AlternateContent>
       <mc:AlternateContent xmlns:mc="http://schemas.openxmlformats.org/markup-compatibility/2006">
         <mc:Choice xmlns:v="urn:schemas-microsoft-com:vml" Requires="v">
-          <p:control spid="10919" name="CheckBox2" r:id="rId5" imgW="2066760" imgH="352440"/>
+          <p:control spid="10934" name="CheckBox2" r:id="rId5" imgW="2066760" imgH="352440"/>
         </mc:Choice>
         <mc:Fallback>
           <p:control name="CheckBox2" r:id="rId5" imgW="2066760" imgH="352440">
@@ -15021,7 +15022,7 @@
       </mc:AlternateContent>
       <mc:AlternateContent xmlns:mc="http://schemas.openxmlformats.org/markup-compatibility/2006">
         <mc:Choice xmlns:v="urn:schemas-microsoft-com:vml" Requires="v">
-          <p:control spid="10920" name="CheckBox5" r:id="rId6" imgW="1990800" imgH="352440"/>
+          <p:control spid="10935" name="CheckBox5" r:id="rId6" imgW="1990800" imgH="352440"/>
         </mc:Choice>
         <mc:Fallback>
           <p:control name="CheckBox5" r:id="rId6" imgW="1990800" imgH="352440">
@@ -16689,7 +16690,7 @@
     <p:controls>
       <mc:AlternateContent xmlns:mc="http://schemas.openxmlformats.org/markup-compatibility/2006">
         <mc:Choice xmlns:v="urn:schemas-microsoft-com:vml" Requires="v">
-          <p:control spid="11691" name="ListBox3" r:id="rId2" imgW="11611080" imgH="666720"/>
+          <p:control spid="11703" name="ListBox3" r:id="rId2" imgW="11611080" imgH="666720"/>
         </mc:Choice>
         <mc:Fallback>
           <p:control name="ListBox3" r:id="rId2" imgW="11611080" imgH="666720">
@@ -16722,7 +16723,7 @@
       </mc:AlternateContent>
       <mc:AlternateContent xmlns:mc="http://schemas.openxmlformats.org/markup-compatibility/2006">
         <mc:Choice xmlns:v="urn:schemas-microsoft-com:vml" Requires="v">
-          <p:control spid="11692" name="ListBox1" r:id="rId3" imgW="11601360" imgH="647640"/>
+          <p:control spid="11704" name="ListBox1" r:id="rId3" imgW="11601360" imgH="647640"/>
         </mc:Choice>
         <mc:Fallback>
           <p:control name="ListBox1" r:id="rId3" imgW="11601360" imgH="647640">
@@ -16755,7 +16756,7 @@
       </mc:AlternateContent>
       <mc:AlternateContent xmlns:mc="http://schemas.openxmlformats.org/markup-compatibility/2006">
         <mc:Choice xmlns:v="urn:schemas-microsoft-com:vml" Requires="v">
-          <p:control spid="11693" name="CheckBox4" r:id="rId4" imgW="847800" imgH="352440"/>
+          <p:control spid="11705" name="CheckBox4" r:id="rId4" imgW="847800" imgH="352440"/>
         </mc:Choice>
         <mc:Fallback>
           <p:control name="CheckBox4" r:id="rId4" imgW="847800" imgH="352440">
@@ -16788,7 +16789,7 @@
       </mc:AlternateContent>
       <mc:AlternateContent xmlns:mc="http://schemas.openxmlformats.org/markup-compatibility/2006">
         <mc:Choice xmlns:v="urn:schemas-microsoft-com:vml" Requires="v">
-          <p:control spid="11694" name="CheckBox5" r:id="rId5" imgW="1076400" imgH="352440"/>
+          <p:control spid="11706" name="CheckBox5" r:id="rId5" imgW="1076400" imgH="352440"/>
         </mc:Choice>
         <mc:Fallback>
           <p:control name="CheckBox5" r:id="rId5" imgW="1076400" imgH="352440">
@@ -18200,7 +18201,7 @@
     <p:controls>
       <mc:AlternateContent xmlns:mc="http://schemas.openxmlformats.org/markup-compatibility/2006">
         <mc:Choice xmlns:v="urn:schemas-microsoft-com:vml" Requires="v">
-          <p:control spid="18728" name="ComboBox1" r:id="rId2" imgW="1380960" imgH="285840"/>
+          <p:control spid="18737" name="ComboBox1" r:id="rId2" imgW="1380960" imgH="285840"/>
         </mc:Choice>
         <mc:Fallback>
           <p:control name="ComboBox1" r:id="rId2" imgW="1380960" imgH="285840">
@@ -18233,7 +18234,7 @@
       </mc:AlternateContent>
       <mc:AlternateContent xmlns:mc="http://schemas.openxmlformats.org/markup-compatibility/2006">
         <mc:Choice xmlns:v="urn:schemas-microsoft-com:vml" Requires="v">
-          <p:control spid="18729" name="ListBox2" r:id="rId3" imgW="2085840" imgH="295200"/>
+          <p:control spid="18738" name="ListBox2" r:id="rId3" imgW="2085840" imgH="295200"/>
         </mc:Choice>
         <mc:Fallback>
           <p:control name="ListBox2" r:id="rId3" imgW="2085840" imgH="295200">
@@ -18266,7 +18267,7 @@
       </mc:AlternateContent>
       <mc:AlternateContent xmlns:mc="http://schemas.openxmlformats.org/markup-compatibility/2006">
         <mc:Choice xmlns:v="urn:schemas-microsoft-com:vml" Requires="v">
-          <p:control spid="18730" name="ComboBox3" r:id="rId4" imgW="1628640" imgH="371520"/>
+          <p:control spid="18739" name="ComboBox3" r:id="rId4" imgW="1628640" imgH="371520"/>
         </mc:Choice>
         <mc:Fallback>
           <p:control name="ComboBox3" r:id="rId4" imgW="1628640" imgH="371520">
@@ -20114,7 +20115,7 @@
     <p:controls>
       <mc:AlternateContent xmlns:mc="http://schemas.openxmlformats.org/markup-compatibility/2006">
         <mc:Choice xmlns:v="urn:schemas-microsoft-com:vml" Requires="v">
-          <p:control spid="19656" name="ListBox1" r:id="rId2" imgW="11420640" imgH="666720"/>
+          <p:control spid="19662" name="ListBox1" r:id="rId2" imgW="11420640" imgH="666720"/>
         </mc:Choice>
         <mc:Fallback>
           <p:control name="ListBox1" r:id="rId2" imgW="11420640" imgH="666720">
@@ -20147,7 +20148,7 @@
       </mc:AlternateContent>
       <mc:AlternateContent xmlns:mc="http://schemas.openxmlformats.org/markup-compatibility/2006">
         <mc:Choice xmlns:v="urn:schemas-microsoft-com:vml" Requires="v">
-          <p:control spid="19657" name="ListBox7" r:id="rId3" imgW="2523960" imgH="247680"/>
+          <p:control spid="19663" name="ListBox7" r:id="rId3" imgW="2523960" imgH="247680"/>
         </mc:Choice>
         <mc:Fallback>
           <p:control name="ListBox7" r:id="rId3" imgW="2523960" imgH="247680">
@@ -23863,7 +23864,7 @@
     <p:controls>
       <mc:AlternateContent xmlns:mc="http://schemas.openxmlformats.org/markup-compatibility/2006">
         <mc:Choice xmlns:v="urn:schemas-microsoft-com:vml" Requires="v">
-          <p:control spid="20779" name="ListBox2" r:id="rId2" imgW="11430000" imgH="380880"/>
+          <p:control spid="20788" name="ListBox2" r:id="rId2" imgW="11430000" imgH="380880"/>
         </mc:Choice>
         <mc:Fallback>
           <p:control name="ListBox2" r:id="rId2" imgW="11430000" imgH="380880">
@@ -23896,7 +23897,7 @@
       </mc:AlternateContent>
       <mc:AlternateContent xmlns:mc="http://schemas.openxmlformats.org/markup-compatibility/2006">
         <mc:Choice xmlns:v="urn:schemas-microsoft-com:vml" Requires="v">
-          <p:control spid="20780" name="ListBox3" r:id="rId3" imgW="10572840" imgH="504720"/>
+          <p:control spid="20789" name="ListBox3" r:id="rId3" imgW="10572840" imgH="504720"/>
         </mc:Choice>
         <mc:Fallback>
           <p:control name="ListBox3" r:id="rId3" imgW="10572840" imgH="504720">
@@ -23929,7 +23930,7 @@
       </mc:AlternateContent>
       <mc:AlternateContent xmlns:mc="http://schemas.openxmlformats.org/markup-compatibility/2006">
         <mc:Choice xmlns:v="urn:schemas-microsoft-com:vml" Requires="v">
-          <p:control spid="20781" name="ListBox1" r:id="rId4" imgW="10572840" imgH="581040"/>
+          <p:control spid="20790" name="ListBox1" r:id="rId4" imgW="10572840" imgH="581040"/>
         </mc:Choice>
         <mc:Fallback>
           <p:control name="ListBox1" r:id="rId4" imgW="10572840" imgH="581040">
@@ -27592,7 +27593,7 @@
     <p:controls>
       <mc:AlternateContent xmlns:mc="http://schemas.openxmlformats.org/markup-compatibility/2006">
         <mc:Choice xmlns:v="urn:schemas-microsoft-com:vml" Requires="v">
-          <p:control spid="21604" name="ComboBox1" r:id="rId2" imgW="2390760" imgH="304920"/>
+          <p:control spid="21607" name="ComboBox1" r:id="rId2" imgW="2390760" imgH="304920"/>
         </mc:Choice>
         <mc:Fallback>
           <p:control name="ComboBox1" r:id="rId2" imgW="2390760" imgH="304920">
@@ -29704,7 +29705,7 @@
     <p:controls>
       <mc:AlternateContent xmlns:mc="http://schemas.openxmlformats.org/markup-compatibility/2006">
         <mc:Choice xmlns:v="urn:schemas-microsoft-com:vml" Requires="v">
-          <p:control spid="23782" name="ComboBox1" r:id="rId2" imgW="1514520" imgH="314280"/>
+          <p:control spid="23791" name="ComboBox1" r:id="rId2" imgW="1514520" imgH="314280"/>
         </mc:Choice>
         <mc:Fallback>
           <p:control name="ComboBox1" r:id="rId2" imgW="1514520" imgH="314280">
@@ -29737,7 +29738,7 @@
       </mc:AlternateContent>
       <mc:AlternateContent xmlns:mc="http://schemas.openxmlformats.org/markup-compatibility/2006">
         <mc:Choice xmlns:v="urn:schemas-microsoft-com:vml" Requires="v">
-          <p:control spid="23783" name="ListBox2" r:id="rId3" imgW="2085840" imgH="295200"/>
+          <p:control spid="23792" name="ListBox2" r:id="rId3" imgW="2085840" imgH="295200"/>
         </mc:Choice>
         <mc:Fallback>
           <p:control name="ListBox2" r:id="rId3" imgW="2085840" imgH="295200">
@@ -29770,7 +29771,7 @@
       </mc:AlternateContent>
       <mc:AlternateContent xmlns:mc="http://schemas.openxmlformats.org/markup-compatibility/2006">
         <mc:Choice xmlns:v="urn:schemas-microsoft-com:vml" Requires="v">
-          <p:control spid="23784" name="ComboBox3" r:id="rId4" imgW="1628640" imgH="371520"/>
+          <p:control spid="23793" name="ComboBox3" r:id="rId4" imgW="1628640" imgH="371520"/>
         </mc:Choice>
         <mc:Fallback>
           <p:control name="ComboBox3" r:id="rId4" imgW="1628640" imgH="371520">
@@ -36509,7 +36510,7 @@
     <p:controls>
       <mc:AlternateContent xmlns:mc="http://schemas.openxmlformats.org/markup-compatibility/2006">
         <mc:Choice xmlns:v="urn:schemas-microsoft-com:vml" Requires="v">
-          <p:control spid="25830" name="ComboBox1" r:id="rId2" imgW="1514520" imgH="314280"/>
+          <p:control spid="25839" name="ComboBox1" r:id="rId2" imgW="1514520" imgH="314280"/>
         </mc:Choice>
         <mc:Fallback>
           <p:control name="ComboBox1" r:id="rId2" imgW="1514520" imgH="314280">
@@ -36542,7 +36543,7 @@
       </mc:AlternateContent>
       <mc:AlternateContent xmlns:mc="http://schemas.openxmlformats.org/markup-compatibility/2006">
         <mc:Choice xmlns:v="urn:schemas-microsoft-com:vml" Requires="v">
-          <p:control spid="25831" name="ListBox2" r:id="rId3" imgW="2085840" imgH="295200"/>
+          <p:control spid="25840" name="ListBox2" r:id="rId3" imgW="2085840" imgH="295200"/>
         </mc:Choice>
         <mc:Fallback>
           <p:control name="ListBox2" r:id="rId3" imgW="2085840" imgH="295200">
@@ -36575,7 +36576,7 @@
       </mc:AlternateContent>
       <mc:AlternateContent xmlns:mc="http://schemas.openxmlformats.org/markup-compatibility/2006">
         <mc:Choice xmlns:v="urn:schemas-microsoft-com:vml" Requires="v">
-          <p:control spid="25832" name="ComboBox3" r:id="rId4" imgW="1628640" imgH="371520"/>
+          <p:control spid="25841" name="ComboBox3" r:id="rId4" imgW="1628640" imgH="371520"/>
         </mc:Choice>
         <mc:Fallback>
           <p:control name="ComboBox3" r:id="rId4" imgW="1628640" imgH="371520">
@@ -38128,7 +38129,7 @@
     <p:controls>
       <mc:AlternateContent xmlns:mc="http://schemas.openxmlformats.org/markup-compatibility/2006">
         <mc:Choice xmlns:v="urn:schemas-microsoft-com:vml" Requires="v">
-          <p:control spid="26854" name="ComboBox1" r:id="rId2" imgW="1514520" imgH="314280"/>
+          <p:control spid="26863" name="ComboBox1" r:id="rId2" imgW="1514520" imgH="314280"/>
         </mc:Choice>
         <mc:Fallback>
           <p:control name="ComboBox1" r:id="rId2" imgW="1514520" imgH="314280">
@@ -38161,7 +38162,7 @@
       </mc:AlternateContent>
       <mc:AlternateContent xmlns:mc="http://schemas.openxmlformats.org/markup-compatibility/2006">
         <mc:Choice xmlns:v="urn:schemas-microsoft-com:vml" Requires="v">
-          <p:control spid="26855" name="ListBox2" r:id="rId3" imgW="2085840" imgH="295200"/>
+          <p:control spid="26864" name="ListBox2" r:id="rId3" imgW="2085840" imgH="295200"/>
         </mc:Choice>
         <mc:Fallback>
           <p:control name="ListBox2" r:id="rId3" imgW="2085840" imgH="295200">
@@ -38194,7 +38195,7 @@
       </mc:AlternateContent>
       <mc:AlternateContent xmlns:mc="http://schemas.openxmlformats.org/markup-compatibility/2006">
         <mc:Choice xmlns:v="urn:schemas-microsoft-com:vml" Requires="v">
-          <p:control spid="26856" name="ComboBox3" r:id="rId4" imgW="1628640" imgH="371520"/>
+          <p:control spid="26865" name="ComboBox3" r:id="rId4" imgW="1628640" imgH="371520"/>
         </mc:Choice>
         <mc:Fallback>
           <p:control name="ComboBox3" r:id="rId4" imgW="1628640" imgH="371520">
@@ -39300,7 +39301,7 @@
     <p:controls>
       <mc:AlternateContent xmlns:mc="http://schemas.openxmlformats.org/markup-compatibility/2006">
         <mc:Choice xmlns:v="urn:schemas-microsoft-com:vml" Requires="v">
-          <p:control spid="28030" name="ListBox3" r:id="rId2" imgW="11420640" imgH="457200"/>
+          <p:control spid="28045" name="ListBox3" r:id="rId2" imgW="11420640" imgH="457200"/>
         </mc:Choice>
         <mc:Fallback>
           <p:control name="ListBox3" r:id="rId2" imgW="11420640" imgH="457200">
@@ -39333,7 +39334,7 @@
       </mc:AlternateContent>
       <mc:AlternateContent xmlns:mc="http://schemas.openxmlformats.org/markup-compatibility/2006">
         <mc:Choice xmlns:v="urn:schemas-microsoft-com:vml" Requires="v">
-          <p:control spid="28031" name="ListBox5" r:id="rId3" imgW="2685960" imgH="276120"/>
+          <p:control spid="28046" name="ListBox5" r:id="rId3" imgW="2685960" imgH="276120"/>
         </mc:Choice>
         <mc:Fallback>
           <p:control name="ListBox5" r:id="rId3" imgW="2685960" imgH="276120">
@@ -39366,7 +39367,7 @@
       </mc:AlternateContent>
       <mc:AlternateContent xmlns:mc="http://schemas.openxmlformats.org/markup-compatibility/2006">
         <mc:Choice xmlns:v="urn:schemas-microsoft-com:vml" Requires="v">
-          <p:control spid="28032" name="ListBox6" r:id="rId4" imgW="2523960" imgH="276120"/>
+          <p:control spid="28047" name="ListBox6" r:id="rId4" imgW="2523960" imgH="276120"/>
         </mc:Choice>
         <mc:Fallback>
           <p:control name="ListBox6" r:id="rId4" imgW="2523960" imgH="276120">
@@ -39399,7 +39400,7 @@
       </mc:AlternateContent>
       <mc:AlternateContent xmlns:mc="http://schemas.openxmlformats.org/markup-compatibility/2006">
         <mc:Choice xmlns:v="urn:schemas-microsoft-com:vml" Requires="v">
-          <p:control spid="28033" name="ListBox7" r:id="rId5" imgW="2523960" imgH="276120"/>
+          <p:control spid="28048" name="ListBox7" r:id="rId5" imgW="2523960" imgH="276120"/>
         </mc:Choice>
         <mc:Fallback>
           <p:control name="ListBox7" r:id="rId5" imgW="2523960" imgH="276120">
@@ -39432,7 +39433,7 @@
       </mc:AlternateContent>
       <mc:AlternateContent xmlns:mc="http://schemas.openxmlformats.org/markup-compatibility/2006">
         <mc:Choice xmlns:v="urn:schemas-microsoft-com:vml" Requires="v">
-          <p:control spid="28034" name="ListBox8" r:id="rId6" imgW="2685960" imgH="276120"/>
+          <p:control spid="28049" name="ListBox8" r:id="rId6" imgW="2685960" imgH="276120"/>
         </mc:Choice>
         <mc:Fallback>
           <p:control name="ListBox8" r:id="rId6" imgW="2685960" imgH="276120">
@@ -40391,7 +40392,7 @@
     <p:controls>
       <mc:AlternateContent xmlns:mc="http://schemas.openxmlformats.org/markup-compatibility/2006">
         <mc:Choice xmlns:v="urn:schemas-microsoft-com:vml" Requires="v">
-          <p:control spid="36886" name="ComboBox1" r:id="rId2" imgW="2381400" imgH="314280"/>
+          <p:control spid="36889" name="ComboBox1" r:id="rId2" imgW="2381400" imgH="314280"/>
         </mc:Choice>
         <mc:Fallback>
           <p:control name="ComboBox1" r:id="rId2" imgW="2381400" imgH="314280">
@@ -43110,7 +43111,7 @@
     <p:controls>
       <mc:AlternateContent xmlns:mc="http://schemas.openxmlformats.org/markup-compatibility/2006">
         <mc:Choice xmlns:v="urn:schemas-microsoft-com:vml" Requires="v">
-          <p:control spid="28750" name="ComboBox1" r:id="rId2" imgW="2362320" imgH="209520"/>
+          <p:control spid="28753" name="ComboBox1" r:id="rId2" imgW="2362320" imgH="209520"/>
         </mc:Choice>
         <mc:Fallback>
           <p:control name="ComboBox1" r:id="rId2" imgW="2362320" imgH="209520">
@@ -45316,7 +45317,7 @@
     <p:controls>
       <mc:AlternateContent xmlns:mc="http://schemas.openxmlformats.org/markup-compatibility/2006">
         <mc:Choice xmlns:v="urn:schemas-microsoft-com:vml" Requires="v">
-          <p:control spid="29850" name="ListBox1" r:id="rId2" imgW="11420640" imgH="752400"/>
+          <p:control spid="29856" name="ListBox1" r:id="rId2" imgW="11420640" imgH="752400"/>
         </mc:Choice>
         <mc:Fallback>
           <p:control name="ListBox1" r:id="rId2" imgW="11420640" imgH="752400">
@@ -45349,7 +45350,7 @@
       </mc:AlternateContent>
       <mc:AlternateContent xmlns:mc="http://schemas.openxmlformats.org/markup-compatibility/2006">
         <mc:Choice xmlns:v="urn:schemas-microsoft-com:vml" Requires="v">
-          <p:control spid="29851" name="ListBox7" r:id="rId3" imgW="2523960" imgH="276120"/>
+          <p:control spid="29857" name="ListBox7" r:id="rId3" imgW="2523960" imgH="276120"/>
         </mc:Choice>
         <mc:Fallback>
           <p:control name="ListBox7" r:id="rId3" imgW="2523960" imgH="276120">
@@ -47761,7 +47762,7 @@
     <p:controls>
       <mc:AlternateContent xmlns:mc="http://schemas.openxmlformats.org/markup-compatibility/2006">
         <mc:Choice xmlns:v="urn:schemas-microsoft-com:vml" Requires="v">
-          <p:control spid="30798" name="ComboBox1" r:id="rId2" imgW="2362320" imgH="209520"/>
+          <p:control spid="30801" name="ComboBox1" r:id="rId2" imgW="2362320" imgH="209520"/>
         </mc:Choice>
         <mc:Fallback>
           <p:control name="ComboBox1" r:id="rId2" imgW="2362320" imgH="209520">
@@ -49166,7 +49167,7 @@
     <p:controls>
       <mc:AlternateContent xmlns:mc="http://schemas.openxmlformats.org/markup-compatibility/2006">
         <mc:Choice xmlns:v="urn:schemas-microsoft-com:vml" Requires="v">
-          <p:control spid="5650" name="ListBox2" r:id="rId2" imgW="2523960" imgH="276120"/>
+          <p:control spid="5662" name="ListBox2" r:id="rId2" imgW="2523960" imgH="276120"/>
         </mc:Choice>
         <mc:Fallback>
           <p:control name="ListBox2" r:id="rId2" imgW="2523960" imgH="276120">
@@ -49199,7 +49200,7 @@
       </mc:AlternateContent>
       <mc:AlternateContent xmlns:mc="http://schemas.openxmlformats.org/markup-compatibility/2006">
         <mc:Choice xmlns:v="urn:schemas-microsoft-com:vml" Requires="v">
-          <p:control spid="5651" name="ListBox4" r:id="rId3" imgW="2523960" imgH="276120"/>
+          <p:control spid="5663" name="ListBox4" r:id="rId3" imgW="2523960" imgH="276120"/>
         </mc:Choice>
         <mc:Fallback>
           <p:control name="ListBox4" r:id="rId3" imgW="2523960" imgH="276120">
@@ -49232,7 +49233,7 @@
       </mc:AlternateContent>
       <mc:AlternateContent xmlns:mc="http://schemas.openxmlformats.org/markup-compatibility/2006">
         <mc:Choice xmlns:v="urn:schemas-microsoft-com:vml" Requires="v">
-          <p:control spid="5652" name="ListBox5" r:id="rId4" imgW="2523960" imgH="276120"/>
+          <p:control spid="5664" name="ListBox5" r:id="rId4" imgW="2523960" imgH="276120"/>
         </mc:Choice>
         <mc:Fallback>
           <p:control name="ListBox5" r:id="rId4" imgW="2523960" imgH="276120">
@@ -49265,7 +49266,7 @@
       </mc:AlternateContent>
       <mc:AlternateContent xmlns:mc="http://schemas.openxmlformats.org/markup-compatibility/2006">
         <mc:Choice xmlns:v="urn:schemas-microsoft-com:vml" Requires="v">
-          <p:control spid="5653" name="ListBox1" r:id="rId5" imgW="2523960" imgH="276120"/>
+          <p:control spid="5665" name="ListBox1" r:id="rId5" imgW="2523960" imgH="276120"/>
         </mc:Choice>
         <mc:Fallback>
           <p:control name="ListBox1" r:id="rId5" imgW="2523960" imgH="276120">
@@ -51282,7 +51283,7 @@
     <p:controls>
       <mc:AlternateContent xmlns:mc="http://schemas.openxmlformats.org/markup-compatibility/2006">
         <mc:Choice xmlns:v="urn:schemas-microsoft-com:vml" Requires="v">
-          <p:control spid="32062" name="ListBox1" r:id="rId2" imgW="11420640" imgH="952560"/>
+          <p:control spid="32077" name="ListBox1" r:id="rId2" imgW="11420640" imgH="952560"/>
         </mc:Choice>
         <mc:Fallback>
           <p:control name="ListBox1" r:id="rId2" imgW="11420640" imgH="952560">
@@ -51315,7 +51316,7 @@
       </mc:AlternateContent>
       <mc:AlternateContent xmlns:mc="http://schemas.openxmlformats.org/markup-compatibility/2006">
         <mc:Choice xmlns:v="urn:schemas-microsoft-com:vml" Requires="v">
-          <p:control spid="32063" name="ListBox7" r:id="rId3" imgW="2523960" imgH="276120"/>
+          <p:control spid="32078" name="ListBox7" r:id="rId3" imgW="2523960" imgH="276120"/>
         </mc:Choice>
         <mc:Fallback>
           <p:control name="ListBox7" r:id="rId3" imgW="2523960" imgH="276120">
@@ -51348,7 +51349,7 @@
       </mc:AlternateContent>
       <mc:AlternateContent xmlns:mc="http://schemas.openxmlformats.org/markup-compatibility/2006">
         <mc:Choice xmlns:v="urn:schemas-microsoft-com:vml" Requires="v">
-          <p:control spid="32064" name="ListBox2" r:id="rId4" imgW="2523960" imgH="276120"/>
+          <p:control spid="32079" name="ListBox2" r:id="rId4" imgW="2523960" imgH="276120"/>
         </mc:Choice>
         <mc:Fallback>
           <p:control name="ListBox2" r:id="rId4" imgW="2523960" imgH="276120">
@@ -51381,7 +51382,7 @@
       </mc:AlternateContent>
       <mc:AlternateContent xmlns:mc="http://schemas.openxmlformats.org/markup-compatibility/2006">
         <mc:Choice xmlns:v="urn:schemas-microsoft-com:vml" Requires="v">
-          <p:control spid="32065" name="ListBox4" r:id="rId5" imgW="2523960" imgH="276120"/>
+          <p:control spid="32080" name="ListBox4" r:id="rId5" imgW="2523960" imgH="276120"/>
         </mc:Choice>
         <mc:Fallback>
           <p:control name="ListBox4" r:id="rId5" imgW="2523960" imgH="276120">
@@ -51414,7 +51415,7 @@
       </mc:AlternateContent>
       <mc:AlternateContent xmlns:mc="http://schemas.openxmlformats.org/markup-compatibility/2006">
         <mc:Choice xmlns:v="urn:schemas-microsoft-com:vml" Requires="v">
-          <p:control spid="32066" name="ListBox5" r:id="rId6" imgW="2523960" imgH="276120"/>
+          <p:control spid="32081" name="ListBox5" r:id="rId6" imgW="2523960" imgH="276120"/>
         </mc:Choice>
         <mc:Fallback>
           <p:control name="ListBox5" r:id="rId6" imgW="2523960" imgH="276120">
@@ -53621,7 +53622,7 @@
     <p:controls>
       <mc:AlternateContent xmlns:mc="http://schemas.openxmlformats.org/markup-compatibility/2006">
         <mc:Choice xmlns:v="urn:schemas-microsoft-com:vml" Requires="v">
-          <p:control spid="7476" name="ComboBox1" r:id="rId2" imgW="1514520" imgH="314280"/>
+          <p:control spid="7485" name="ComboBox1" r:id="rId2" imgW="1514520" imgH="314280"/>
         </mc:Choice>
         <mc:Fallback>
           <p:control name="ComboBox1" r:id="rId2" imgW="1514520" imgH="314280">
@@ -53654,7 +53655,7 @@
       </mc:AlternateContent>
       <mc:AlternateContent xmlns:mc="http://schemas.openxmlformats.org/markup-compatibility/2006">
         <mc:Choice xmlns:v="urn:schemas-microsoft-com:vml" Requires="v">
-          <p:control spid="7477" name="ListBox2" r:id="rId3" imgW="2085840" imgH="295200"/>
+          <p:control spid="7486" name="ListBox2" r:id="rId3" imgW="2085840" imgH="295200"/>
         </mc:Choice>
         <mc:Fallback>
           <p:control name="ListBox2" r:id="rId3" imgW="2085840" imgH="295200">
@@ -53687,7 +53688,7 @@
       </mc:AlternateContent>
       <mc:AlternateContent xmlns:mc="http://schemas.openxmlformats.org/markup-compatibility/2006">
         <mc:Choice xmlns:v="urn:schemas-microsoft-com:vml" Requires="v">
-          <p:control spid="7478" name="ComboBox3" r:id="rId4" imgW="1628640" imgH="295200"/>
+          <p:control spid="7487" name="ComboBox3" r:id="rId4" imgW="1628640" imgH="295200"/>
         </mc:Choice>
         <mc:Fallback>
           <p:control name="ComboBox3" r:id="rId4" imgW="1628640" imgH="295200">

</xml_diff>